<commit_message>
Updating the architecture diagram
</commit_message>
<xml_diff>
--- a/docs/architecture.pptx
+++ b/docs/architecture.pptx
@@ -225,7 +225,7 @@
           <a:p>
             <a:fld id="{49A7721D-1176-A640-AC48-B82F78C92D56}" type="datetimeFigureOut">
               <a:rPr lang="en-US" smtClean="0"/>
-              <a:t>2/27/19</a:t>
+              <a:t>3/21/19</a:t>
             </a:fld>
             <a:endParaRPr lang="en-US" dirty="0"/>
           </a:p>
@@ -402,7 +402,7 @@
           <a:p>
             <a:fld id="{C884A089-FB25-6D46-9D21-F0F04A18BCA8}" type="datetimeFigureOut">
               <a:rPr lang="en-US" smtClean="0"/>
-              <a:t>2/27/19</a:t>
+              <a:t>3/21/19</a:t>
             </a:fld>
             <a:endParaRPr lang="en-US" dirty="0"/>
           </a:p>
@@ -12801,10 +12801,10 @@
         </p:nvGrpSpPr>
         <p:grpSpPr>
           <a:xfrm>
-            <a:off x="3565488" y="4888908"/>
-            <a:ext cx="1273649" cy="641599"/>
+            <a:off x="2921795" y="5495002"/>
+            <a:ext cx="1001720" cy="691189"/>
             <a:chOff x="2554666" y="4607363"/>
-            <a:chExt cx="2301904" cy="1159582"/>
+            <a:chExt cx="2301904" cy="1520257"/>
           </a:xfrm>
         </p:grpSpPr>
         <p:sp>
@@ -12822,7 +12822,7 @@
           <p:spPr>
             <a:xfrm>
               <a:off x="2554666" y="5382977"/>
-              <a:ext cx="2301904" cy="383968"/>
+              <a:ext cx="2301904" cy="744643"/>
             </a:xfrm>
             <a:prstGeom prst="rect">
               <a:avLst/>
@@ -12837,7 +12837,7 @@
             <a:p>
               <a:pPr algn="ctr"/>
               <a:r>
-                <a:rPr lang="en-US" sz="1000" dirty="0"/>
+                <a:rPr lang="en-US" sz="800" dirty="0"/>
                 <a:t>Amazon API Gateway</a:t>
               </a:r>
             </a:p>
@@ -12894,10 +12894,10 @@
         </p:nvGrpSpPr>
         <p:grpSpPr>
           <a:xfrm>
-            <a:off x="1939076" y="3733273"/>
-            <a:ext cx="1149686" cy="641599"/>
+            <a:off x="1565312" y="4527087"/>
+            <a:ext cx="904224" cy="691189"/>
             <a:chOff x="364783" y="2784539"/>
-            <a:chExt cx="2077862" cy="1159582"/>
+            <a:chExt cx="2077862" cy="1520257"/>
           </a:xfrm>
         </p:grpSpPr>
         <p:sp>
@@ -12915,7 +12915,7 @@
           <p:spPr>
             <a:xfrm>
               <a:off x="364783" y="3560153"/>
-              <a:ext cx="2077862" cy="383968"/>
+              <a:ext cx="2077862" cy="744643"/>
             </a:xfrm>
             <a:prstGeom prst="rect">
               <a:avLst/>
@@ -12930,7 +12930,7 @@
             <a:p>
               <a:pPr algn="ctr"/>
               <a:r>
-                <a:rPr lang="en-US" sz="1000" dirty="0"/>
+                <a:rPr lang="en-US" sz="800" dirty="0"/>
                 <a:t>Amazon CloudFront</a:t>
               </a:r>
             </a:p>
@@ -12987,10 +12987,10 @@
         </p:nvGrpSpPr>
         <p:grpSpPr>
           <a:xfrm>
-            <a:off x="5662793" y="4247374"/>
-            <a:ext cx="972031" cy="694488"/>
-            <a:chOff x="5788360" y="3612846"/>
-            <a:chExt cx="1756781" cy="1255171"/>
+            <a:off x="4514123" y="4967849"/>
+            <a:ext cx="821002" cy="580183"/>
+            <a:chOff x="5656931" y="3612846"/>
+            <a:chExt cx="1886622" cy="1276103"/>
           </a:xfrm>
         </p:grpSpPr>
         <p:sp>
@@ -13007,8 +13007,8 @@
           </p:nvSpPr>
           <p:spPr>
             <a:xfrm>
-              <a:off x="5788360" y="4144885"/>
-              <a:ext cx="1756781" cy="723132"/>
+              <a:off x="5656931" y="4144305"/>
+              <a:ext cx="1886622" cy="744644"/>
             </a:xfrm>
             <a:prstGeom prst="rect">
               <a:avLst/>
@@ -13023,7 +13023,7 @@
             <a:p>
               <a:pPr algn="ctr"/>
               <a:r>
-                <a:rPr lang="en-US" sz="1000" dirty="0"/>
+                <a:rPr lang="en-US" sz="800" dirty="0"/>
                 <a:t>Autocomplete search</a:t>
               </a:r>
             </a:p>
@@ -13080,10 +13080,10 @@
         </p:nvGrpSpPr>
         <p:grpSpPr>
           <a:xfrm>
-            <a:off x="5480106" y="5036318"/>
-            <a:ext cx="1273649" cy="654341"/>
+            <a:off x="4427634" y="5616129"/>
+            <a:ext cx="1001720" cy="578549"/>
             <a:chOff x="5535149" y="2183203"/>
-            <a:chExt cx="2301904" cy="1182612"/>
+            <a:chExt cx="2301904" cy="1272510"/>
           </a:xfrm>
         </p:grpSpPr>
         <p:sp>
@@ -13101,7 +13101,7 @@
           <p:spPr>
             <a:xfrm>
               <a:off x="5535149" y="2981847"/>
-              <a:ext cx="2301904" cy="383968"/>
+              <a:ext cx="2301904" cy="473866"/>
             </a:xfrm>
             <a:prstGeom prst="rect">
               <a:avLst/>
@@ -13116,7 +13116,7 @@
             <a:p>
               <a:pPr algn="ctr"/>
               <a:r>
-                <a:rPr lang="en-US" sz="1000" dirty="0"/>
+                <a:rPr lang="en-US" sz="800" dirty="0"/>
                 <a:t>AWS Lambda</a:t>
               </a:r>
             </a:p>
@@ -13173,10 +13173,10 @@
         </p:nvGrpSpPr>
         <p:grpSpPr>
           <a:xfrm>
-            <a:off x="3580907" y="706020"/>
-            <a:ext cx="1273649" cy="652778"/>
+            <a:off x="2933922" y="2057891"/>
+            <a:ext cx="1001720" cy="577265"/>
             <a:chOff x="7713647" y="5027377"/>
-            <a:chExt cx="2301904" cy="1179787"/>
+            <a:chExt cx="2301904" cy="1269684"/>
           </a:xfrm>
         </p:grpSpPr>
         <p:sp>
@@ -13194,7 +13194,7 @@
           <p:spPr>
             <a:xfrm>
               <a:off x="7713647" y="5823196"/>
-              <a:ext cx="2301904" cy="383968"/>
+              <a:ext cx="2301904" cy="473865"/>
             </a:xfrm>
             <a:prstGeom prst="rect">
               <a:avLst/>
@@ -13209,14 +13209,14 @@
             <a:p>
               <a:pPr algn="ctr"/>
               <a:r>
-                <a:rPr lang="en-US" sz="1000" dirty="0"/>
+                <a:rPr lang="en-US" sz="800" dirty="0"/>
                 <a:t>AWS </a:t>
               </a:r>
               <a:r>
-                <a:rPr lang="en-US" sz="1000" dirty="0" err="1"/>
+                <a:rPr lang="en-US" sz="800" dirty="0" err="1"/>
                 <a:t>Fargate</a:t>
               </a:r>
-              <a:endParaRPr lang="en-US" sz="1000" dirty="0"/>
+              <a:endParaRPr lang="en-US" sz="800" dirty="0"/>
             </a:p>
           </p:txBody>
         </p:sp>
@@ -13271,10 +13271,10 @@
         </p:nvGrpSpPr>
         <p:grpSpPr>
           <a:xfrm>
-            <a:off x="3775525" y="1434712"/>
-            <a:ext cx="949282" cy="512915"/>
-            <a:chOff x="9654845" y="5079545"/>
-            <a:chExt cx="1715666" cy="927007"/>
+            <a:off x="3024107" y="2656665"/>
+            <a:ext cx="821350" cy="411593"/>
+            <a:chOff x="9510350" y="5079545"/>
+            <a:chExt cx="1887422" cy="905291"/>
           </a:xfrm>
         </p:grpSpPr>
         <p:sp>
@@ -13291,8 +13291,8 @@
           </p:nvSpPr>
           <p:spPr>
             <a:xfrm>
-              <a:off x="9654845" y="5561549"/>
-              <a:ext cx="1715666" cy="445003"/>
+              <a:off x="9510350" y="5510971"/>
+              <a:ext cx="1887422" cy="473865"/>
             </a:xfrm>
             <a:prstGeom prst="rect">
               <a:avLst/>
@@ -13307,7 +13307,7 @@
             <a:p>
               <a:pPr algn="ctr"/>
               <a:r>
-                <a:rPr lang="en-US" sz="1000" dirty="0"/>
+                <a:rPr lang="en-US" sz="800" dirty="0"/>
                 <a:t>NPM follower</a:t>
               </a:r>
             </a:p>
@@ -13364,10 +13364,10 @@
         </p:nvGrpSpPr>
         <p:grpSpPr>
           <a:xfrm>
-            <a:off x="7034820" y="714184"/>
-            <a:ext cx="1338701" cy="786612"/>
+            <a:off x="5626344" y="1951279"/>
+            <a:ext cx="1052883" cy="779257"/>
             <a:chOff x="2460054" y="1002878"/>
-            <a:chExt cx="2419475" cy="1421668"/>
+            <a:chExt cx="2419475" cy="1713962"/>
           </a:xfrm>
         </p:grpSpPr>
         <p:sp>
@@ -13384,8 +13384,8 @@
           </p:nvSpPr>
           <p:spPr>
             <a:xfrm>
-              <a:off x="2460054" y="1701415"/>
-              <a:ext cx="2419475" cy="723131"/>
+              <a:off x="2460054" y="1701416"/>
+              <a:ext cx="2419475" cy="1015424"/>
             </a:xfrm>
             <a:prstGeom prst="rect">
               <a:avLst/>
@@ -13400,7 +13400,7 @@
             <a:p>
               <a:pPr algn="ctr"/>
               <a:r>
-                <a:rPr lang="en-US" sz="1000" dirty="0">
+                <a:rPr lang="en-US" sz="800" dirty="0">
                   <a:latin typeface="+mj-lt"/>
                   <a:ea typeface="Amazon Ember" panose="020B0603020204020204" pitchFamily="34" charset="0"/>
                   <a:cs typeface="Amazon Ember" panose="020B0603020204020204" pitchFamily="34" charset="0"/>
@@ -13461,10 +13461,10 @@
         </p:nvGrpSpPr>
         <p:grpSpPr>
           <a:xfrm>
-            <a:off x="7181674" y="1535603"/>
-            <a:ext cx="1059260" cy="533192"/>
-            <a:chOff x="2791916" y="2446136"/>
-            <a:chExt cx="1914434" cy="963655"/>
+            <a:off x="5732759" y="2768871"/>
+            <a:ext cx="887700" cy="421683"/>
+            <a:chOff x="2834823" y="2446136"/>
+            <a:chExt cx="2039893" cy="927484"/>
           </a:xfrm>
         </p:grpSpPr>
         <p:sp>
@@ -13481,8 +13481,8 @@
           </p:nvSpPr>
           <p:spPr>
             <a:xfrm>
-              <a:off x="2791916" y="2964788"/>
-              <a:ext cx="1914434" cy="445003"/>
+              <a:off x="2834823" y="2899755"/>
+              <a:ext cx="2039893" cy="473865"/>
             </a:xfrm>
             <a:prstGeom prst="rect">
               <a:avLst/>
@@ -13497,7 +13497,7 @@
             <a:p>
               <a:pPr algn="ctr"/>
               <a:r>
-                <a:rPr lang="en-US" sz="1000" dirty="0" err="1">
+                <a:rPr lang="en-US" sz="800" dirty="0" err="1">
                   <a:latin typeface="Courier" pitchFamily="2" charset="0"/>
                   <a:ea typeface="Amazon Ember" panose="020B0603020204020204" pitchFamily="34" charset="0"/>
                   <a:cs typeface="Amazon Ember" panose="020B0603020204020204" pitchFamily="34" charset="0"/>
@@ -13505,7 +13505,7 @@
                 <a:t>toCrawl</a:t>
               </a:r>
               <a:r>
-                <a:rPr lang="en-US" sz="1000" dirty="0">
+                <a:rPr lang="en-US" sz="800" dirty="0">
                   <a:latin typeface="+mj-lt"/>
                   <a:ea typeface="Amazon Ember" panose="020B0603020204020204" pitchFamily="34" charset="0"/>
                   <a:cs typeface="Amazon Ember" panose="020B0603020204020204" pitchFamily="34" charset="0"/>
@@ -13566,10 +13566,10 @@
         </p:nvGrpSpPr>
         <p:grpSpPr>
           <a:xfrm>
-            <a:off x="7116700" y="3147096"/>
-            <a:ext cx="1273649" cy="603311"/>
+            <a:off x="5714809" y="4063742"/>
+            <a:ext cx="1001720" cy="659727"/>
             <a:chOff x="8300940" y="699888"/>
-            <a:chExt cx="2301904" cy="1090382"/>
+            <a:chExt cx="2301904" cy="1451057"/>
           </a:xfrm>
         </p:grpSpPr>
         <p:sp>
@@ -13587,7 +13587,7 @@
           <p:spPr>
             <a:xfrm>
               <a:off x="8300940" y="1406302"/>
-              <a:ext cx="2301904" cy="383968"/>
+              <a:ext cx="2301904" cy="744643"/>
             </a:xfrm>
             <a:prstGeom prst="rect">
               <a:avLst/>
@@ -13602,7 +13602,7 @@
             <a:p>
               <a:pPr algn="ctr"/>
               <a:r>
-                <a:rPr lang="en-US" sz="1000" dirty="0"/>
+                <a:rPr lang="en-US" sz="800" dirty="0"/>
                 <a:t>Amazon DynamoDB</a:t>
               </a:r>
             </a:p>
@@ -13659,10 +13659,10 @@
         </p:nvGrpSpPr>
         <p:grpSpPr>
           <a:xfrm>
-            <a:off x="7297337" y="4581930"/>
-            <a:ext cx="879901" cy="527184"/>
+            <a:off x="5856879" y="5242756"/>
+            <a:ext cx="692039" cy="569423"/>
             <a:chOff x="9043102" y="2065699"/>
-            <a:chExt cx="1590271" cy="952796"/>
+            <a:chExt cx="1590271" cy="1252436"/>
           </a:xfrm>
         </p:grpSpPr>
         <p:sp>
@@ -13679,8 +13679,8 @@
           </p:nvSpPr>
           <p:spPr>
             <a:xfrm>
-              <a:off x="9043102" y="2573492"/>
-              <a:ext cx="1590271" cy="445003"/>
+              <a:off x="9043102" y="2573491"/>
+              <a:ext cx="1590271" cy="744644"/>
             </a:xfrm>
             <a:prstGeom prst="rect">
               <a:avLst/>
@@ -13695,7 +13695,7 @@
             <a:p>
               <a:pPr algn="ctr"/>
               <a:r>
-                <a:rPr lang="en-US" sz="1000" dirty="0"/>
+                <a:rPr lang="en-US" sz="800" dirty="0"/>
                 <a:t>changelogs</a:t>
               </a:r>
             </a:p>
@@ -13752,10 +13752,10 @@
         </p:nvGrpSpPr>
         <p:grpSpPr>
           <a:xfrm>
-            <a:off x="923323" y="1437212"/>
-            <a:ext cx="918504" cy="615445"/>
+            <a:off x="902796" y="2107620"/>
+            <a:ext cx="722400" cy="560590"/>
             <a:chOff x="5746486" y="5579699"/>
-            <a:chExt cx="1660039" cy="1112311"/>
+            <a:chExt cx="1660039" cy="1233005"/>
           </a:xfrm>
         </p:grpSpPr>
         <p:pic>
@@ -13809,7 +13809,7 @@
           <p:spPr>
             <a:xfrm>
               <a:off x="5746486" y="6068062"/>
-              <a:ext cx="1660039" cy="623948"/>
+              <a:ext cx="1660039" cy="744642"/>
             </a:xfrm>
             <a:prstGeom prst="rect">
               <a:avLst/>
@@ -13824,7 +13824,7 @@
             <a:p>
               <a:pPr algn="ctr"/>
               <a:r>
-                <a:rPr lang="en-US" sz="1000" dirty="0">
+                <a:rPr lang="en-US" sz="800" dirty="0">
                   <a:solidFill>
                     <a:srgbClr val="232F3E"/>
                   </a:solidFill>
@@ -13835,7 +13835,7 @@
             <a:p>
               <a:pPr algn="ctr"/>
               <a:r>
-                <a:rPr lang="en-US" sz="1000" dirty="0">
+                <a:rPr lang="en-US" sz="800" dirty="0">
                   <a:solidFill>
                     <a:srgbClr val="232F3E"/>
                   </a:solidFill>
@@ -13860,10 +13860,10 @@
         </p:nvGrpSpPr>
         <p:grpSpPr>
           <a:xfrm>
-            <a:off x="1064909" y="3729350"/>
-            <a:ext cx="593555" cy="636468"/>
+            <a:off x="877783" y="4523865"/>
+            <a:ext cx="466829" cy="563863"/>
             <a:chOff x="640320" y="4509711"/>
-            <a:chExt cx="1072750" cy="1150312"/>
+            <a:chExt cx="1072750" cy="1240209"/>
           </a:xfrm>
         </p:grpSpPr>
         <p:pic>
@@ -13917,7 +13917,7 @@
           <p:spPr>
             <a:xfrm>
               <a:off x="640320" y="5276054"/>
-              <a:ext cx="1072750" cy="383969"/>
+              <a:ext cx="1072750" cy="473866"/>
             </a:xfrm>
             <a:prstGeom prst="rect">
               <a:avLst/>
@@ -13932,7 +13932,7 @@
             <a:p>
               <a:pPr algn="ctr"/>
               <a:r>
-                <a:rPr lang="en-US" sz="1000" dirty="0">
+                <a:rPr lang="en-US" sz="800" dirty="0">
                   <a:solidFill>
                     <a:srgbClr val="232F3E"/>
                   </a:solidFill>
@@ -13957,10 +13957,10 @@
         </p:nvGrpSpPr>
         <p:grpSpPr>
           <a:xfrm>
-            <a:off x="1941622" y="498021"/>
-            <a:ext cx="6622715" cy="5705893"/>
+            <a:off x="1724211" y="498022"/>
+            <a:ext cx="5096314" cy="5857808"/>
             <a:chOff x="5636266" y="3149162"/>
-            <a:chExt cx="11969439" cy="8716048"/>
+            <a:chExt cx="11711089" cy="10889647"/>
           </a:xfrm>
         </p:grpSpPr>
         <p:pic>
@@ -14014,7 +14014,7 @@
           <p:spPr>
             <a:xfrm>
               <a:off x="5636268" y="3149162"/>
-              <a:ext cx="11969437" cy="8716048"/>
+              <a:ext cx="11711087" cy="10889647"/>
             </a:xfrm>
             <a:prstGeom prst="rect">
               <a:avLst/>
@@ -14053,7 +14053,7 @@
             <a:p>
               <a:pPr algn="l"/>
               <a:r>
-                <a:rPr lang="en-US" sz="1200" dirty="0">
+                <a:rPr lang="en-US" sz="800" dirty="0">
                   <a:ln w="0"/>
                   <a:solidFill>
                     <a:sysClr val="windowText" lastClr="000000"/>
@@ -14079,8 +14079,8 @@
         </p:nvGrpSpPr>
         <p:grpSpPr>
           <a:xfrm>
-            <a:off x="3566917" y="2719254"/>
-            <a:ext cx="1273649" cy="1841608"/>
+            <a:off x="2922918" y="3712181"/>
+            <a:ext cx="1001720" cy="1513263"/>
             <a:chOff x="2903390" y="864530"/>
             <a:chExt cx="1476106" cy="2134348"/>
           </a:xfrm>
@@ -14100,9 +14100,9 @@
           <p:grpSpPr>
             <a:xfrm>
               <a:off x="2903390" y="987164"/>
-              <a:ext cx="1476106" cy="856170"/>
+              <a:ext cx="1476106" cy="1107205"/>
               <a:chOff x="4410781" y="447552"/>
-              <a:chExt cx="2301904" cy="1335149"/>
+              <a:chExt cx="2301904" cy="1726624"/>
             </a:xfrm>
           </p:grpSpPr>
           <p:pic>
@@ -14156,7 +14156,7 @@
             <p:spPr>
               <a:xfrm>
                 <a:off x="4410781" y="1158752"/>
-                <a:ext cx="2301904" cy="623949"/>
+                <a:ext cx="2301904" cy="1015424"/>
               </a:xfrm>
               <a:prstGeom prst="rect">
                 <a:avLst/>
@@ -14171,7 +14171,7 @@
               <a:p>
                 <a:pPr algn="ctr"/>
                 <a:r>
-                  <a:rPr lang="en-US" sz="1000" dirty="0"/>
+                  <a:rPr lang="en-US" sz="800" dirty="0"/>
                   <a:t>Amazon Simple Storage Service (S3)</a:t>
                 </a:r>
               </a:p>
@@ -14193,9 +14193,9 @@
           <p:grpSpPr>
             <a:xfrm>
               <a:off x="3068806" y="2112670"/>
-              <a:ext cx="1098155" cy="746198"/>
+              <a:ext cx="1098155" cy="823593"/>
               <a:chOff x="926155" y="1055193"/>
-              <a:chExt cx="1712511" cy="1163655"/>
+              <a:chExt cx="1712511" cy="1284349"/>
             </a:xfrm>
           </p:grpSpPr>
           <p:pic>
@@ -14249,7 +14249,7 @@
             <p:spPr>
               <a:xfrm>
                 <a:off x="926155" y="1594898"/>
-                <a:ext cx="1712511" cy="623950"/>
+                <a:ext cx="1712511" cy="744644"/>
               </a:xfrm>
               <a:prstGeom prst="rect">
                 <a:avLst/>
@@ -14264,7 +14264,7 @@
               <a:p>
                 <a:pPr algn="ctr"/>
                 <a:r>
-                  <a:rPr lang="en-US" sz="1000" dirty="0"/>
+                  <a:rPr lang="en-US" sz="800" dirty="0"/>
                   <a:t>Static HTML and JSON</a:t>
                 </a:r>
               </a:p>
@@ -14325,7 +14325,7 @@
             <a:lstStyle/>
             <a:p>
               <a:pPr algn="ctr"/>
-              <a:endParaRPr lang="en-US" sz="1200" dirty="0">
+              <a:endParaRPr lang="en-US" sz="800" dirty="0">
                 <a:solidFill>
                   <a:srgbClr val="5A6B86"/>
                 </a:solidFill>
@@ -14348,8 +14348,8 @@
         </p:nvSpPr>
         <p:spPr>
           <a:xfrm>
-            <a:off x="5508960" y="3240981"/>
-            <a:ext cx="1213845" cy="2543399"/>
+            <a:off x="4450328" y="4140888"/>
+            <a:ext cx="954684" cy="2089930"/>
           </a:xfrm>
           <a:prstGeom prst="rect">
             <a:avLst/>
@@ -14388,7 +14388,7 @@
           <a:lstStyle/>
           <a:p>
             <a:pPr algn="ctr"/>
-            <a:endParaRPr lang="en-US" sz="1200" dirty="0">
+            <a:endParaRPr lang="en-US" sz="800" dirty="0">
               <a:solidFill>
                 <a:srgbClr val="5A6B86"/>
               </a:solidFill>
@@ -14410,10 +14410,10 @@
         </p:nvGrpSpPr>
         <p:grpSpPr>
           <a:xfrm>
-            <a:off x="5710430" y="3422624"/>
-            <a:ext cx="804142" cy="522535"/>
-            <a:chOff x="5976958" y="3632939"/>
-            <a:chExt cx="1453350" cy="944393"/>
+            <a:off x="4570018" y="4290146"/>
+            <a:ext cx="709993" cy="479471"/>
+            <a:chOff x="5887876" y="3632939"/>
+            <a:chExt cx="1631528" cy="1054587"/>
           </a:xfrm>
         </p:grpSpPr>
         <p:sp>
@@ -14430,8 +14430,8 @@
           </p:nvSpPr>
           <p:spPr>
             <a:xfrm>
-              <a:off x="5976958" y="4193364"/>
-              <a:ext cx="1453350" cy="383968"/>
+              <a:off x="5887876" y="4213661"/>
+              <a:ext cx="1631528" cy="473865"/>
             </a:xfrm>
             <a:prstGeom prst="rect">
               <a:avLst/>
@@ -14446,7 +14446,7 @@
             <a:p>
               <a:pPr algn="ctr"/>
               <a:r>
-                <a:rPr lang="en-US" sz="1000" dirty="0"/>
+                <a:rPr lang="en-US" sz="800" dirty="0"/>
                 <a:t>Crawl repo</a:t>
               </a:r>
             </a:p>
@@ -14503,10 +14503,10 @@
         </p:nvGrpSpPr>
         <p:grpSpPr>
           <a:xfrm>
-            <a:off x="7465802" y="3996959"/>
-            <a:ext cx="500052" cy="527638"/>
+            <a:off x="5989376" y="4762081"/>
+            <a:ext cx="393289" cy="446686"/>
             <a:chOff x="9355612" y="2065698"/>
-            <a:chExt cx="903760" cy="953617"/>
+            <a:chExt cx="903760" cy="982479"/>
           </a:xfrm>
         </p:grpSpPr>
         <p:sp>
@@ -14523,8 +14523,8 @@
           </p:nvSpPr>
           <p:spPr>
             <a:xfrm>
-              <a:off x="9355612" y="2574312"/>
-              <a:ext cx="903760" cy="445003"/>
+              <a:off x="9355612" y="2574311"/>
+              <a:ext cx="903760" cy="473866"/>
             </a:xfrm>
             <a:prstGeom prst="rect">
               <a:avLst/>
@@ -14539,7 +14539,7 @@
             <a:p>
               <a:pPr algn="ctr"/>
               <a:r>
-                <a:rPr lang="en-US" sz="1000" dirty="0"/>
+                <a:rPr lang="en-US" sz="800" dirty="0"/>
                 <a:t>feed</a:t>
               </a:r>
             </a:p>
@@ -14596,10 +14596,10 @@
         </p:nvGrpSpPr>
         <p:grpSpPr>
           <a:xfrm>
-            <a:off x="7224232" y="5236388"/>
-            <a:ext cx="983191" cy="522242"/>
+            <a:off x="5799383" y="5780529"/>
+            <a:ext cx="773276" cy="442253"/>
             <a:chOff x="8917684" y="2065699"/>
-            <a:chExt cx="1776951" cy="943865"/>
+            <a:chExt cx="1776951" cy="972729"/>
           </a:xfrm>
         </p:grpSpPr>
         <p:sp>
@@ -14616,8 +14616,8 @@
           </p:nvSpPr>
           <p:spPr>
             <a:xfrm>
-              <a:off x="8917684" y="2564561"/>
-              <a:ext cx="1776951" cy="445003"/>
+              <a:off x="8917684" y="2564562"/>
+              <a:ext cx="1776951" cy="473866"/>
             </a:xfrm>
             <a:prstGeom prst="rect">
               <a:avLst/>
@@ -14632,7 +14632,7 @@
             <a:p>
               <a:pPr algn="ctr"/>
               <a:r>
-                <a:rPr lang="en-US" sz="1000" dirty="0"/>
+                <a:rPr lang="en-US" sz="800" dirty="0"/>
                 <a:t>search-index </a:t>
               </a:r>
             </a:p>
@@ -14689,8 +14689,8 @@
         </p:nvSpPr>
         <p:spPr>
           <a:xfrm>
-            <a:off x="7195155" y="3008746"/>
-            <a:ext cx="1091134" cy="2789888"/>
+            <a:off x="5776514" y="3950059"/>
+            <a:ext cx="858173" cy="2292472"/>
           </a:xfrm>
           <a:prstGeom prst="rect">
             <a:avLst/>
@@ -14729,7 +14729,7 @@
           <a:lstStyle/>
           <a:p>
             <a:pPr algn="ctr"/>
-            <a:endParaRPr lang="en-US" sz="1200" dirty="0">
+            <a:endParaRPr lang="en-US" sz="800" dirty="0">
               <a:solidFill>
                 <a:srgbClr val="5A6B86"/>
               </a:solidFill>
@@ -14751,8 +14751,8 @@
         </p:nvSpPr>
         <p:spPr>
           <a:xfrm>
-            <a:off x="7095465" y="603637"/>
-            <a:ext cx="1234921" cy="1676537"/>
+            <a:off x="5674041" y="1860441"/>
+            <a:ext cx="971261" cy="1377623"/>
           </a:xfrm>
           <a:prstGeom prst="rect">
             <a:avLst/>
@@ -14791,7 +14791,7 @@
           <a:lstStyle/>
           <a:p>
             <a:pPr algn="ctr"/>
-            <a:endParaRPr lang="en-US" sz="1200" dirty="0">
+            <a:endParaRPr lang="en-US" sz="800" dirty="0">
               <a:solidFill>
                 <a:srgbClr val="5A6B86"/>
               </a:solidFill>
@@ -14813,8 +14813,8 @@
         </p:nvSpPr>
         <p:spPr>
           <a:xfrm>
-            <a:off x="3580907" y="604157"/>
-            <a:ext cx="1291217" cy="1933119"/>
+            <a:off x="2933922" y="1974190"/>
+            <a:ext cx="1015537" cy="1588459"/>
           </a:xfrm>
           <a:prstGeom prst="rect">
             <a:avLst/>
@@ -14853,7 +14853,7 @@
           <a:lstStyle/>
           <a:p>
             <a:pPr algn="ctr"/>
-            <a:endParaRPr lang="en-US" sz="1200" dirty="0">
+            <a:endParaRPr lang="en-US" sz="800" dirty="0">
               <a:solidFill>
                 <a:srgbClr val="5A6B86"/>
               </a:solidFill>
@@ -14872,14 +14872,15 @@
           </p:cNvPr>
           <p:cNvCxnSpPr>
             <a:cxnSpLocks/>
+            <a:stCxn id="15" idx="1"/>
             <a:endCxn id="28" idx="3"/>
           </p:cNvCxnSpPr>
           <p:nvPr/>
         </p:nvCxnSpPr>
         <p:spPr>
           <a:xfrm flipH="1" flipV="1">
-            <a:off x="1512573" y="1567211"/>
-            <a:ext cx="2492985" cy="13388"/>
+            <a:off x="1366239" y="2214441"/>
+            <a:ext cx="1969631" cy="549045"/>
           </a:xfrm>
           <a:prstGeom prst="straightConnector1">
             <a:avLst/>
@@ -14925,8 +14926,8 @@
         </p:nvCxnSpPr>
         <p:spPr>
           <a:xfrm flipH="1" flipV="1">
-            <a:off x="1561321" y="3928397"/>
-            <a:ext cx="755844" cy="1631"/>
+            <a:off x="1268209" y="4687422"/>
+            <a:ext cx="594468" cy="1340"/>
           </a:xfrm>
           <a:prstGeom prst="straightConnector1">
             <a:avLst/>
@@ -14972,8 +14973,8 @@
         </p:nvCxnSpPr>
         <p:spPr>
           <a:xfrm flipV="1">
-            <a:off x="6514572" y="2068795"/>
-            <a:ext cx="1196732" cy="1770139"/>
+            <a:off x="5280011" y="3190554"/>
+            <a:ext cx="896598" cy="1471341"/>
           </a:xfrm>
           <a:prstGeom prst="straightConnector1">
             <a:avLst/>
@@ -15012,14 +15013,15 @@
           </p:cNvPr>
           <p:cNvCxnSpPr>
             <a:cxnSpLocks/>
+            <a:stCxn id="5" idx="1"/>
             <a:endCxn id="7" idx="3"/>
           </p:cNvCxnSpPr>
           <p:nvPr/>
         </p:nvCxnSpPr>
         <p:spPr>
           <a:xfrm flipH="1" flipV="1">
-            <a:off x="2710674" y="3930027"/>
-            <a:ext cx="1227163" cy="1130058"/>
+            <a:off x="2172170" y="4688762"/>
+            <a:ext cx="1095738" cy="967915"/>
           </a:xfrm>
           <a:prstGeom prst="straightConnector1">
             <a:avLst/>
@@ -15064,8 +15066,8 @@
         </p:nvCxnSpPr>
         <p:spPr>
           <a:xfrm flipH="1">
-            <a:off x="4462563" y="4741807"/>
-            <a:ext cx="1200230" cy="343055"/>
+            <a:off x="3570147" y="5378755"/>
+            <a:ext cx="943976" cy="277000"/>
           </a:xfrm>
           <a:prstGeom prst="straightConnector1">
             <a:avLst/>
@@ -15110,9 +15112,9 @@
           <p:nvPr/>
         </p:nvCxnSpPr>
         <p:spPr>
-          <a:xfrm flipH="1">
-            <a:off x="2710674" y="3926202"/>
-            <a:ext cx="1342742" cy="3825"/>
+          <a:xfrm flipH="1" flipV="1">
+            <a:off x="2172170" y="4688762"/>
+            <a:ext cx="1133378" cy="15177"/>
           </a:xfrm>
           <a:prstGeom prst="straightConnector1">
             <a:avLst/>
@@ -15154,8 +15156,8 @@
         </p:nvSpPr>
         <p:spPr>
           <a:xfrm>
-            <a:off x="3581992" y="4718162"/>
-            <a:ext cx="1237848" cy="1070317"/>
+            <a:off x="2934775" y="5354699"/>
+            <a:ext cx="973563" cy="879488"/>
           </a:xfrm>
           <a:prstGeom prst="rect">
             <a:avLst/>
@@ -15194,7 +15196,7 @@
           <a:lstStyle/>
           <a:p>
             <a:pPr algn="ctr"/>
-            <a:endParaRPr lang="en-US" sz="1200" dirty="0">
+            <a:endParaRPr lang="en-US" sz="800" dirty="0">
               <a:solidFill>
                 <a:srgbClr val="5A6B86"/>
               </a:solidFill>
@@ -15220,8 +15222,8 @@
         </p:nvCxnSpPr>
         <p:spPr>
           <a:xfrm flipV="1">
-            <a:off x="4313413" y="3838934"/>
-            <a:ext cx="1397017" cy="87268"/>
+            <a:off x="3510035" y="4661895"/>
+            <a:ext cx="1059983" cy="42044"/>
           </a:xfrm>
           <a:prstGeom prst="straightConnector1">
             <a:avLst/>
@@ -15260,14 +15262,13 @@
           </p:cNvPr>
           <p:cNvCxnSpPr>
             <a:cxnSpLocks/>
-            <a:stCxn id="19" idx="1"/>
           </p:cNvCxnSpPr>
           <p:nvPr/>
         </p:nvCxnSpPr>
         <p:spPr>
           <a:xfrm flipH="1" flipV="1">
-            <a:off x="4434607" y="1580599"/>
-            <a:ext cx="3169556" cy="85002"/>
+            <a:off x="3530440" y="2761673"/>
+            <a:ext cx="2416102" cy="108130"/>
           </a:xfrm>
           <a:prstGeom prst="straightConnector1">
             <a:avLst/>
@@ -15309,10 +15310,10 @@
         </p:nvGrpSpPr>
         <p:grpSpPr>
           <a:xfrm>
-            <a:off x="3852248" y="2004180"/>
-            <a:ext cx="705735" cy="513061"/>
-            <a:chOff x="9827299" y="5079545"/>
-            <a:chExt cx="1275496" cy="927271"/>
+            <a:off x="3078959" y="3124600"/>
+            <a:ext cx="633077" cy="373978"/>
+            <a:chOff x="9670186" y="5079545"/>
+            <a:chExt cx="1454780" cy="822558"/>
           </a:xfrm>
         </p:grpSpPr>
         <p:sp>
@@ -15329,8 +15330,8 @@
           </p:nvSpPr>
           <p:spPr>
             <a:xfrm>
-              <a:off x="9827299" y="5561813"/>
-              <a:ext cx="1275496" cy="445003"/>
+              <a:off x="9670186" y="5428238"/>
+              <a:ext cx="1454780" cy="473865"/>
             </a:xfrm>
             <a:prstGeom prst="rect">
               <a:avLst/>
@@ -15345,10 +15346,10 @@
             <a:p>
               <a:pPr algn="ctr"/>
               <a:r>
-                <a:rPr lang="en-US" sz="1000" dirty="0" err="1"/>
+                <a:rPr lang="en-US" sz="800" dirty="0" err="1"/>
                 <a:t>socket.io</a:t>
               </a:r>
-              <a:endParaRPr lang="en-US" sz="1000" dirty="0"/>
+              <a:endParaRPr lang="en-US" sz="800" dirty="0"/>
             </a:p>
           </p:txBody>
         </p:sp>
@@ -15417,8 +15418,8 @@
         </p:blipFill>
         <p:spPr>
           <a:xfrm>
-            <a:off x="5970310" y="2704492"/>
-            <a:ext cx="298961" cy="298961"/>
+            <a:off x="4813178" y="3700051"/>
+            <a:ext cx="235132" cy="245659"/>
           </a:xfrm>
           <a:prstGeom prst="rect">
             <a:avLst/>
@@ -15453,8 +15454,8 @@
         </p:blipFill>
         <p:spPr>
           <a:xfrm>
-            <a:off x="5924024" y="1813883"/>
-            <a:ext cx="389661" cy="389661"/>
+            <a:off x="4776774" y="2968231"/>
+            <a:ext cx="306467" cy="320187"/>
           </a:xfrm>
           <a:prstGeom prst="rect">
             <a:avLst/>
@@ -15475,8 +15476,8 @@
         </p:nvSpPr>
         <p:spPr>
           <a:xfrm>
-            <a:off x="5649988" y="2185679"/>
-            <a:ext cx="922172" cy="400110"/>
+            <a:off x="4561246" y="3273739"/>
+            <a:ext cx="757530" cy="338554"/>
           </a:xfrm>
           <a:prstGeom prst="rect">
             <a:avLst/>
@@ -15491,17 +15492,17 @@
           <a:p>
             <a:pPr algn="ctr"/>
             <a:r>
-              <a:rPr lang="en-US" sz="1000" dirty="0"/>
+              <a:rPr lang="en-US" sz="800" dirty="0"/>
               <a:t>Amazon</a:t>
             </a:r>
           </a:p>
           <a:p>
             <a:pPr algn="ctr"/>
             <a:r>
-              <a:rPr lang="en-US" sz="1000" dirty="0" err="1"/>
+              <a:rPr lang="en-US" sz="800" dirty="0" err="1"/>
               <a:t>ElastiCache</a:t>
             </a:r>
-            <a:endParaRPr lang="en-US" sz="1000" dirty="0"/>
+            <a:endParaRPr lang="en-US" sz="800" dirty="0"/>
           </a:p>
         </p:txBody>
       </p:sp>
@@ -15523,8 +15524,8 @@
         </p:nvCxnSpPr>
         <p:spPr>
           <a:xfrm flipH="1">
-            <a:off x="6118948" y="3003453"/>
-            <a:ext cx="843" cy="419171"/>
+            <a:off x="4930081" y="3945710"/>
+            <a:ext cx="663" cy="344436"/>
           </a:xfrm>
           <a:prstGeom prst="straightConnector1">
             <a:avLst/>
@@ -15569,8 +15570,8 @@
         </p:nvCxnSpPr>
         <p:spPr>
           <a:xfrm>
-            <a:off x="4557983" y="2394131"/>
-            <a:ext cx="1337507" cy="430937"/>
+            <a:off x="3712036" y="3390857"/>
+            <a:ext cx="973926" cy="347542"/>
           </a:xfrm>
           <a:prstGeom prst="straightConnector1">
             <a:avLst/>
@@ -15615,8 +15616,8 @@
         </p:nvCxnSpPr>
         <p:spPr>
           <a:xfrm flipV="1">
-            <a:off x="2605361" y="2394131"/>
-            <a:ext cx="1246887" cy="1676740"/>
+            <a:off x="2230871" y="3390856"/>
+            <a:ext cx="848088" cy="1217896"/>
           </a:xfrm>
           <a:prstGeom prst="straightConnector1">
             <a:avLst/>
@@ -15658,8 +15659,8 @@
         </p:nvSpPr>
         <p:spPr>
           <a:xfrm>
-            <a:off x="5506983" y="1732382"/>
-            <a:ext cx="1208182" cy="1414937"/>
+            <a:off x="4448773" y="2901261"/>
+            <a:ext cx="950230" cy="1162665"/>
           </a:xfrm>
           <a:prstGeom prst="rect">
             <a:avLst/>
@@ -15698,7 +15699,7 @@
           <a:lstStyle/>
           <a:p>
             <a:pPr algn="ctr"/>
-            <a:endParaRPr lang="en-US" sz="1200" dirty="0">
+            <a:endParaRPr lang="en-US" sz="800" dirty="0">
               <a:solidFill>
                 <a:srgbClr val="5A6B86"/>
               </a:solidFill>
@@ -15724,8 +15725,8 @@
         </p:nvCxnSpPr>
         <p:spPr>
           <a:xfrm>
-            <a:off x="6514572" y="3838934"/>
-            <a:ext cx="1071258" cy="288023"/>
+            <a:off x="5280011" y="4661895"/>
+            <a:ext cx="803766" cy="207006"/>
           </a:xfrm>
           <a:prstGeom prst="straightConnector1">
             <a:avLst/>
@@ -15771,8 +15772,8 @@
         </p:nvCxnSpPr>
         <p:spPr>
           <a:xfrm>
-            <a:off x="6514572" y="3838934"/>
-            <a:ext cx="1075706" cy="872995"/>
+            <a:off x="5280011" y="4661895"/>
+            <a:ext cx="807265" cy="687682"/>
           </a:xfrm>
           <a:prstGeom prst="straightConnector1">
             <a:avLst/>
@@ -15818,8 +15819,8 @@
         </p:nvCxnSpPr>
         <p:spPr>
           <a:xfrm>
-            <a:off x="6514572" y="3838934"/>
-            <a:ext cx="1071995" cy="1527452"/>
+            <a:off x="5280011" y="4661895"/>
+            <a:ext cx="804347" cy="1225455"/>
           </a:xfrm>
           <a:prstGeom prst="straightConnector1">
             <a:avLst/>
@@ -15865,8 +15866,8 @@
         </p:nvCxnSpPr>
         <p:spPr>
           <a:xfrm>
-            <a:off x="6634824" y="4741807"/>
-            <a:ext cx="951743" cy="624579"/>
+            <a:off x="5335125" y="5378755"/>
+            <a:ext cx="749233" cy="508595"/>
           </a:xfrm>
           <a:prstGeom prst="straightConnector1">
             <a:avLst/>
@@ -15877,6 +15878,739 @@
             </a:solidFill>
             <a:headEnd type="none" w="med" len="med"/>
             <a:tailEnd type="none" w="med" len="med"/>
+          </a:ln>
+        </p:spPr>
+        <p:style>
+          <a:lnRef idx="1">
+            <a:schemeClr val="accent1"/>
+          </a:lnRef>
+          <a:fillRef idx="0">
+            <a:schemeClr val="accent1"/>
+          </a:fillRef>
+          <a:effectRef idx="0">
+            <a:schemeClr val="accent1"/>
+          </a:effectRef>
+          <a:fontRef idx="minor">
+            <a:schemeClr val="tx1"/>
+          </a:fontRef>
+        </p:style>
+      </p:cxnSp>
+      <p:grpSp>
+        <p:nvGrpSpPr>
+          <p:cNvPr id="85" name="Group 84">
+            <a:extLst>
+              <a:ext uri="{FF2B5EF4-FFF2-40B4-BE49-F238E27FC236}">
+                <a16:creationId xmlns:a16="http://schemas.microsoft.com/office/drawing/2014/main" id="{96B1F44E-7559-CE48-B4E7-580D5169083D}"/>
+              </a:ext>
+            </a:extLst>
+          </p:cNvPr>
+          <p:cNvGrpSpPr/>
+          <p:nvPr/>
+        </p:nvGrpSpPr>
+        <p:grpSpPr>
+          <a:xfrm>
+            <a:off x="3947913" y="838767"/>
+            <a:ext cx="1001720" cy="578549"/>
+            <a:chOff x="5535149" y="2183203"/>
+            <a:chExt cx="2301904" cy="1272510"/>
+          </a:xfrm>
+        </p:grpSpPr>
+        <p:sp>
+          <p:nvSpPr>
+            <p:cNvPr id="86" name="TextBox 85">
+              <a:extLst>
+                <a:ext uri="{FF2B5EF4-FFF2-40B4-BE49-F238E27FC236}">
+                  <a16:creationId xmlns:a16="http://schemas.microsoft.com/office/drawing/2014/main" id="{2B951285-F329-5E49-8EC1-BF7FEF743F9A}"/>
+                </a:ext>
+              </a:extLst>
+            </p:cNvPr>
+            <p:cNvSpPr txBox="1"/>
+            <p:nvPr/>
+          </p:nvSpPr>
+          <p:spPr>
+            <a:xfrm>
+              <a:off x="5535149" y="2981847"/>
+              <a:ext cx="2301904" cy="473866"/>
+            </a:xfrm>
+            <a:prstGeom prst="rect">
+              <a:avLst/>
+            </a:prstGeom>
+            <a:noFill/>
+          </p:spPr>
+          <p:txBody>
+            <a:bodyPr wrap="square" rtlCol="0">
+              <a:spAutoFit/>
+            </a:bodyPr>
+            <a:lstStyle/>
+            <a:p>
+              <a:pPr algn="ctr"/>
+              <a:r>
+                <a:rPr lang="en-US" sz="800" dirty="0"/>
+                <a:t>AWS Lambda</a:t>
+              </a:r>
+            </a:p>
+          </p:txBody>
+        </p:sp>
+        <p:pic>
+          <p:nvPicPr>
+            <p:cNvPr id="87" name="Graphic 86">
+              <a:extLst>
+                <a:ext uri="{FF2B5EF4-FFF2-40B4-BE49-F238E27FC236}">
+                  <a16:creationId xmlns:a16="http://schemas.microsoft.com/office/drawing/2014/main" id="{DD24E7E5-224E-F04E-96C7-372A1F4EA885}"/>
+                </a:ext>
+              </a:extLst>
+            </p:cNvPr>
+            <p:cNvPicPr>
+              <a:picLocks noChangeAspect="1"/>
+            </p:cNvPicPr>
+            <p:nvPr/>
+          </p:nvPicPr>
+          <p:blipFill>
+            <a:blip r:embed="rId8">
+              <a:extLst>
+                <a:ext uri="{96DAC541-7B7A-43D3-8B79-37D633B846F1}">
+                  <asvg:svgBlip xmlns:asvg="http://schemas.microsoft.com/office/drawing/2016/SVG/main" r:embed="rId9"/>
+                </a:ext>
+              </a:extLst>
+            </a:blip>
+            <a:stretch>
+              <a:fillRect/>
+            </a:stretch>
+          </p:blipFill>
+          <p:spPr>
+            <a:xfrm>
+              <a:off x="6330501" y="2183203"/>
+              <a:ext cx="711200" cy="711200"/>
+            </a:xfrm>
+            <a:prstGeom prst="rect">
+              <a:avLst/>
+            </a:prstGeom>
+          </p:spPr>
+        </p:pic>
+      </p:grpSp>
+      <p:sp>
+        <p:nvSpPr>
+          <p:cNvPr id="107" name="Rectangle 106">
+            <a:extLst>
+              <a:ext uri="{FF2B5EF4-FFF2-40B4-BE49-F238E27FC236}">
+                <a16:creationId xmlns:a16="http://schemas.microsoft.com/office/drawing/2014/main" id="{667A3594-D0C6-434D-B47F-7D29CDA6CEC6}"/>
+              </a:ext>
+            </a:extLst>
+          </p:cNvPr>
+          <p:cNvSpPr/>
+          <p:nvPr/>
+        </p:nvSpPr>
+        <p:spPr>
+          <a:xfrm>
+            <a:off x="2944215" y="754253"/>
+            <a:ext cx="1868964" cy="1134653"/>
+          </a:xfrm>
+          <a:prstGeom prst="rect">
+            <a:avLst/>
+          </a:prstGeom>
+          <a:noFill/>
+          <a:ln w="12700">
+            <a:solidFill>
+              <a:srgbClr val="D96613"/>
+            </a:solidFill>
+            <a:prstDash val="dash"/>
+          </a:ln>
+        </p:spPr>
+        <p:style>
+          <a:lnRef idx="2">
+            <a:schemeClr val="accent1">
+              <a:shade val="50000"/>
+            </a:schemeClr>
+          </a:lnRef>
+          <a:fillRef idx="1">
+            <a:schemeClr val="accent1"/>
+          </a:fillRef>
+          <a:effectRef idx="0">
+            <a:schemeClr val="accent1"/>
+          </a:effectRef>
+          <a:fontRef idx="minor">
+            <a:schemeClr val="lt1"/>
+          </a:fontRef>
+        </p:style>
+        <p:txBody>
+          <a:bodyPr rot="0" spcFirstLastPara="0" vertOverflow="overflow" horzOverflow="overflow" vert="horz" wrap="square" lIns="91440" tIns="91440" rIns="91440" bIns="45720" numCol="1" spcCol="0" rtlCol="0" fromWordArt="0" anchor="t" anchorCtr="0" forceAA="0" compatLnSpc="1">
+            <a:prstTxWarp prst="textNoShape">
+              <a:avLst/>
+            </a:prstTxWarp>
+            <a:noAutofit/>
+          </a:bodyPr>
+          <a:lstStyle/>
+          <a:p>
+            <a:pPr algn="ctr"/>
+            <a:endParaRPr lang="en-US" sz="800" dirty="0">
+              <a:solidFill>
+                <a:srgbClr val="5A6B86"/>
+              </a:solidFill>
+            </a:endParaRPr>
+          </a:p>
+        </p:txBody>
+      </p:sp>
+      <p:grpSp>
+        <p:nvGrpSpPr>
+          <p:cNvPr id="88" name="Group 87">
+            <a:extLst>
+              <a:ext uri="{FF2B5EF4-FFF2-40B4-BE49-F238E27FC236}">
+                <a16:creationId xmlns:a16="http://schemas.microsoft.com/office/drawing/2014/main" id="{15A885E5-976F-5549-B003-F362F2D834E1}"/>
+              </a:ext>
+            </a:extLst>
+          </p:cNvPr>
+          <p:cNvGrpSpPr/>
+          <p:nvPr/>
+        </p:nvGrpSpPr>
+        <p:grpSpPr>
+          <a:xfrm>
+            <a:off x="902795" y="796455"/>
+            <a:ext cx="722400" cy="439309"/>
+            <a:chOff x="807055" y="1231302"/>
+            <a:chExt cx="722400" cy="439309"/>
+          </a:xfrm>
+        </p:grpSpPr>
+        <p:pic>
+          <p:nvPicPr>
+            <p:cNvPr id="111" name="Graphic 110">
+              <a:extLst>
+                <a:ext uri="{FF2B5EF4-FFF2-40B4-BE49-F238E27FC236}">
+                  <a16:creationId xmlns:a16="http://schemas.microsoft.com/office/drawing/2014/main" id="{C3D1A303-418A-B646-A9E7-972808D1D0B1}"/>
+                </a:ext>
+              </a:extLst>
+            </p:cNvPr>
+            <p:cNvPicPr>
+              <a:picLocks noChangeAspect="1"/>
+            </p:cNvPicPr>
+            <p:nvPr/>
+          </p:nvPicPr>
+          <p:blipFill>
+            <a:blip r:embed="rId36">
+              <a:extLst>
+                <a:ext uri="{96DAC541-7B7A-43D3-8B79-37D633B846F1}">
+                  <asvg:svgBlip xmlns:asvg="http://schemas.microsoft.com/office/drawing/2016/SVG/main" r:embed="rId37"/>
+                </a:ext>
+              </a:extLst>
+            </a:blip>
+            <a:stretch>
+              <a:fillRect/>
+            </a:stretch>
+          </p:blipFill>
+          <p:spPr>
+            <a:xfrm>
+              <a:off x="1050780" y="1231302"/>
+              <a:ext cx="234950" cy="234950"/>
+            </a:xfrm>
+            <a:prstGeom prst="rect">
+              <a:avLst/>
+            </a:prstGeom>
+          </p:spPr>
+        </p:pic>
+        <p:sp>
+          <p:nvSpPr>
+            <p:cNvPr id="112" name="TextBox 111">
+              <a:extLst>
+                <a:ext uri="{FF2B5EF4-FFF2-40B4-BE49-F238E27FC236}">
+                  <a16:creationId xmlns:a16="http://schemas.microsoft.com/office/drawing/2014/main" id="{1928C648-C77C-774E-958F-A2D9A4425C8D}"/>
+                </a:ext>
+              </a:extLst>
+            </p:cNvPr>
+            <p:cNvSpPr txBox="1"/>
+            <p:nvPr/>
+          </p:nvSpPr>
+          <p:spPr>
+            <a:xfrm>
+              <a:off x="807055" y="1455167"/>
+              <a:ext cx="722400" cy="215444"/>
+            </a:xfrm>
+            <a:prstGeom prst="rect">
+              <a:avLst/>
+            </a:prstGeom>
+            <a:noFill/>
+          </p:spPr>
+          <p:txBody>
+            <a:bodyPr wrap="square" rtlCol="0">
+              <a:spAutoFit/>
+            </a:bodyPr>
+            <a:lstStyle/>
+            <a:p>
+              <a:pPr algn="ctr"/>
+              <a:r>
+                <a:rPr lang="en-US" sz="800" dirty="0" err="1">
+                  <a:solidFill>
+                    <a:srgbClr val="232F3E"/>
+                  </a:solidFill>
+                </a:rPr>
+                <a:t>PyPI</a:t>
+              </a:r>
+              <a:endParaRPr lang="en-US" sz="800" dirty="0">
+                <a:solidFill>
+                  <a:srgbClr val="232F3E"/>
+                </a:solidFill>
+              </a:endParaRPr>
+            </a:p>
+          </p:txBody>
+        </p:sp>
+      </p:grpSp>
+      <p:grpSp>
+        <p:nvGrpSpPr>
+          <p:cNvPr id="114" name="Group 113">
+            <a:extLst>
+              <a:ext uri="{FF2B5EF4-FFF2-40B4-BE49-F238E27FC236}">
+                <a16:creationId xmlns:a16="http://schemas.microsoft.com/office/drawing/2014/main" id="{21C8A270-7AC3-344E-9DAB-9B791B1851D1}"/>
+              </a:ext>
+            </a:extLst>
+          </p:cNvPr>
+          <p:cNvGrpSpPr/>
+          <p:nvPr/>
+        </p:nvGrpSpPr>
+        <p:grpSpPr>
+          <a:xfrm>
+            <a:off x="907675" y="1424878"/>
+            <a:ext cx="722400" cy="439309"/>
+            <a:chOff x="807055" y="1231302"/>
+            <a:chExt cx="722400" cy="439309"/>
+          </a:xfrm>
+        </p:grpSpPr>
+        <p:pic>
+          <p:nvPicPr>
+            <p:cNvPr id="115" name="Graphic 114">
+              <a:extLst>
+                <a:ext uri="{FF2B5EF4-FFF2-40B4-BE49-F238E27FC236}">
+                  <a16:creationId xmlns:a16="http://schemas.microsoft.com/office/drawing/2014/main" id="{DA547057-1EDC-E741-BA1B-C1FCC20B426C}"/>
+                </a:ext>
+              </a:extLst>
+            </p:cNvPr>
+            <p:cNvPicPr>
+              <a:picLocks noChangeAspect="1"/>
+            </p:cNvPicPr>
+            <p:nvPr/>
+          </p:nvPicPr>
+          <p:blipFill>
+            <a:blip r:embed="rId36">
+              <a:extLst>
+                <a:ext uri="{96DAC541-7B7A-43D3-8B79-37D633B846F1}">
+                  <asvg:svgBlip xmlns:asvg="http://schemas.microsoft.com/office/drawing/2016/SVG/main" r:embed="rId37"/>
+                </a:ext>
+              </a:extLst>
+            </a:blip>
+            <a:stretch>
+              <a:fillRect/>
+            </a:stretch>
+          </p:blipFill>
+          <p:spPr>
+            <a:xfrm>
+              <a:off x="1050780" y="1231302"/>
+              <a:ext cx="234950" cy="234950"/>
+            </a:xfrm>
+            <a:prstGeom prst="rect">
+              <a:avLst/>
+            </a:prstGeom>
+          </p:spPr>
+        </p:pic>
+        <p:sp>
+          <p:nvSpPr>
+            <p:cNvPr id="116" name="TextBox 115">
+              <a:extLst>
+                <a:ext uri="{FF2B5EF4-FFF2-40B4-BE49-F238E27FC236}">
+                  <a16:creationId xmlns:a16="http://schemas.microsoft.com/office/drawing/2014/main" id="{57984ADD-17F1-E64B-92B2-3638ED77AFC4}"/>
+                </a:ext>
+              </a:extLst>
+            </p:cNvPr>
+            <p:cNvSpPr txBox="1"/>
+            <p:nvPr/>
+          </p:nvSpPr>
+          <p:spPr>
+            <a:xfrm>
+              <a:off x="807055" y="1455167"/>
+              <a:ext cx="722400" cy="215444"/>
+            </a:xfrm>
+            <a:prstGeom prst="rect">
+              <a:avLst/>
+            </a:prstGeom>
+            <a:noFill/>
+          </p:spPr>
+          <p:txBody>
+            <a:bodyPr wrap="square" rtlCol="0">
+              <a:spAutoFit/>
+            </a:bodyPr>
+            <a:lstStyle/>
+            <a:p>
+              <a:pPr algn="ctr"/>
+              <a:r>
+                <a:rPr lang="en-US" sz="800" dirty="0" err="1">
+                  <a:solidFill>
+                    <a:srgbClr val="232F3E"/>
+                  </a:solidFill>
+                </a:rPr>
+                <a:t>RubyGems</a:t>
+              </a:r>
+              <a:endParaRPr lang="en-US" sz="800" dirty="0">
+                <a:solidFill>
+                  <a:srgbClr val="232F3E"/>
+                </a:solidFill>
+              </a:endParaRPr>
+            </a:p>
+          </p:txBody>
+        </p:sp>
+      </p:grpSp>
+      <p:grpSp>
+        <p:nvGrpSpPr>
+          <p:cNvPr id="117" name="Group 116">
+            <a:extLst>
+              <a:ext uri="{FF2B5EF4-FFF2-40B4-BE49-F238E27FC236}">
+                <a16:creationId xmlns:a16="http://schemas.microsoft.com/office/drawing/2014/main" id="{D768E9E9-C4E4-A942-8E9C-F4CF9539D157}"/>
+              </a:ext>
+            </a:extLst>
+          </p:cNvPr>
+          <p:cNvGrpSpPr/>
+          <p:nvPr/>
+        </p:nvGrpSpPr>
+        <p:grpSpPr>
+          <a:xfrm>
+            <a:off x="3088965" y="869546"/>
+            <a:ext cx="774264" cy="449982"/>
+            <a:chOff x="5867654" y="3632939"/>
+            <a:chExt cx="1779220" cy="989727"/>
+          </a:xfrm>
+        </p:grpSpPr>
+        <p:sp>
+          <p:nvSpPr>
+            <p:cNvPr id="118" name="TextBox 117">
+              <a:extLst>
+                <a:ext uri="{FF2B5EF4-FFF2-40B4-BE49-F238E27FC236}">
+                  <a16:creationId xmlns:a16="http://schemas.microsoft.com/office/drawing/2014/main" id="{B1B5C19F-CE93-7F4B-8DAD-45AA66F7BC1D}"/>
+                </a:ext>
+              </a:extLst>
+            </p:cNvPr>
+            <p:cNvSpPr txBox="1"/>
+            <p:nvPr/>
+          </p:nvSpPr>
+          <p:spPr>
+            <a:xfrm>
+              <a:off x="5867654" y="4148801"/>
+              <a:ext cx="1779220" cy="473865"/>
+            </a:xfrm>
+            <a:prstGeom prst="rect">
+              <a:avLst/>
+            </a:prstGeom>
+            <a:noFill/>
+          </p:spPr>
+          <p:txBody>
+            <a:bodyPr wrap="square" rtlCol="0">
+              <a:spAutoFit/>
+            </a:bodyPr>
+            <a:lstStyle/>
+            <a:p>
+              <a:pPr algn="ctr"/>
+              <a:r>
+                <a:rPr lang="en-US" sz="800" dirty="0" err="1"/>
+                <a:t>PyPI</a:t>
+              </a:r>
+              <a:endParaRPr lang="en-US" sz="800" dirty="0"/>
+            </a:p>
+          </p:txBody>
+        </p:sp>
+        <p:pic>
+          <p:nvPicPr>
+            <p:cNvPr id="119" name="Graphic 118">
+              <a:extLst>
+                <a:ext uri="{FF2B5EF4-FFF2-40B4-BE49-F238E27FC236}">
+                  <a16:creationId xmlns:a16="http://schemas.microsoft.com/office/drawing/2014/main" id="{463CA982-8382-3349-AC52-27E114567C03}"/>
+                </a:ext>
+              </a:extLst>
+            </p:cNvPr>
+            <p:cNvPicPr>
+              <a:picLocks noChangeAspect="1"/>
+            </p:cNvPicPr>
+            <p:nvPr/>
+          </p:nvPicPr>
+          <p:blipFill>
+            <a:blip r:embed="rId6">
+              <a:extLst>
+                <a:ext uri="{96DAC541-7B7A-43D3-8B79-37D633B846F1}">
+                  <asvg:svgBlip xmlns:asvg="http://schemas.microsoft.com/office/drawing/2016/SVG/main" r:embed="rId7"/>
+                </a:ext>
+              </a:extLst>
+            </a:blip>
+            <a:stretch>
+              <a:fillRect/>
+            </a:stretch>
+          </p:blipFill>
+          <p:spPr>
+            <a:xfrm>
+              <a:off x="6480335" y="3632939"/>
+              <a:ext cx="469899" cy="469899"/>
+            </a:xfrm>
+            <a:prstGeom prst="rect">
+              <a:avLst/>
+            </a:prstGeom>
+          </p:spPr>
+        </p:pic>
+      </p:grpSp>
+      <p:grpSp>
+        <p:nvGrpSpPr>
+          <p:cNvPr id="120" name="Group 119">
+            <a:extLst>
+              <a:ext uri="{FF2B5EF4-FFF2-40B4-BE49-F238E27FC236}">
+                <a16:creationId xmlns:a16="http://schemas.microsoft.com/office/drawing/2014/main" id="{927A4588-5787-8E4D-8C17-0F14C3842506}"/>
+              </a:ext>
+            </a:extLst>
+          </p:cNvPr>
+          <p:cNvGrpSpPr/>
+          <p:nvPr/>
+        </p:nvGrpSpPr>
+        <p:grpSpPr>
+          <a:xfrm>
+            <a:off x="2945325" y="1382261"/>
+            <a:ext cx="1032040" cy="456784"/>
+            <a:chOff x="5471645" y="3612846"/>
+            <a:chExt cx="2371577" cy="1004690"/>
+          </a:xfrm>
+        </p:grpSpPr>
+        <p:sp>
+          <p:nvSpPr>
+            <p:cNvPr id="121" name="TextBox 120">
+              <a:extLst>
+                <a:ext uri="{FF2B5EF4-FFF2-40B4-BE49-F238E27FC236}">
+                  <a16:creationId xmlns:a16="http://schemas.microsoft.com/office/drawing/2014/main" id="{3584910C-844B-5C42-AFED-E6A9152C2130}"/>
+                </a:ext>
+              </a:extLst>
+            </p:cNvPr>
+            <p:cNvSpPr txBox="1"/>
+            <p:nvPr/>
+          </p:nvSpPr>
+          <p:spPr>
+            <a:xfrm>
+              <a:off x="5471645" y="4143670"/>
+              <a:ext cx="2371577" cy="473866"/>
+            </a:xfrm>
+            <a:prstGeom prst="rect">
+              <a:avLst/>
+            </a:prstGeom>
+            <a:noFill/>
+          </p:spPr>
+          <p:txBody>
+            <a:bodyPr wrap="square" rtlCol="0">
+              <a:spAutoFit/>
+            </a:bodyPr>
+            <a:lstStyle/>
+            <a:p>
+              <a:pPr algn="ctr"/>
+              <a:r>
+                <a:rPr lang="en-US" sz="800" dirty="0" err="1"/>
+                <a:t>RubyGems</a:t>
+              </a:r>
+              <a:endParaRPr lang="en-US" sz="800" dirty="0"/>
+            </a:p>
+          </p:txBody>
+        </p:sp>
+        <p:pic>
+          <p:nvPicPr>
+            <p:cNvPr id="122" name="Graphic 121">
+              <a:extLst>
+                <a:ext uri="{FF2B5EF4-FFF2-40B4-BE49-F238E27FC236}">
+                  <a16:creationId xmlns:a16="http://schemas.microsoft.com/office/drawing/2014/main" id="{BE71D1D4-D2B2-CD42-8D58-681CDDEA04F2}"/>
+                </a:ext>
+              </a:extLst>
+            </p:cNvPr>
+            <p:cNvPicPr>
+              <a:picLocks noChangeAspect="1"/>
+            </p:cNvPicPr>
+            <p:nvPr/>
+          </p:nvPicPr>
+          <p:blipFill>
+            <a:blip r:embed="rId6">
+              <a:extLst>
+                <a:ext uri="{96DAC541-7B7A-43D3-8B79-37D633B846F1}">
+                  <asvg:svgBlip xmlns:asvg="http://schemas.microsoft.com/office/drawing/2016/SVG/main" r:embed="rId7"/>
+                </a:ext>
+              </a:extLst>
+            </a:blip>
+            <a:stretch>
+              <a:fillRect/>
+            </a:stretch>
+          </p:blipFill>
+          <p:spPr>
+            <a:xfrm>
+              <a:off x="6445491" y="3612846"/>
+              <a:ext cx="469899" cy="469899"/>
+            </a:xfrm>
+            <a:prstGeom prst="rect">
+              <a:avLst/>
+            </a:prstGeom>
+          </p:spPr>
+        </p:pic>
+      </p:grpSp>
+      <p:cxnSp>
+        <p:nvCxnSpPr>
+          <p:cNvPr id="123" name="Straight Arrow Connector 122">
+            <a:extLst>
+              <a:ext uri="{FF2B5EF4-FFF2-40B4-BE49-F238E27FC236}">
+                <a16:creationId xmlns:a16="http://schemas.microsoft.com/office/drawing/2014/main" id="{79A81F0B-AB38-D04F-B074-6F237203A909}"/>
+              </a:ext>
+            </a:extLst>
+          </p:cNvPr>
+          <p:cNvCxnSpPr>
+            <a:cxnSpLocks/>
+            <a:endCxn id="119" idx="3"/>
+          </p:cNvCxnSpPr>
+          <p:nvPr/>
+        </p:nvCxnSpPr>
+        <p:spPr>
+          <a:xfrm flipH="1" flipV="1">
+            <a:off x="3560072" y="976367"/>
+            <a:ext cx="2391784" cy="1850996"/>
+          </a:xfrm>
+          <a:prstGeom prst="straightConnector1">
+            <a:avLst/>
+          </a:prstGeom>
+          <a:ln w="12700">
+            <a:solidFill>
+              <a:srgbClr val="545B64"/>
+            </a:solidFill>
+            <a:headEnd type="arrow" w="med" len="sm"/>
+            <a:tailEnd type="none" w="med" len="sm"/>
+          </a:ln>
+        </p:spPr>
+        <p:style>
+          <a:lnRef idx="1">
+            <a:schemeClr val="accent1"/>
+          </a:lnRef>
+          <a:fillRef idx="0">
+            <a:schemeClr val="accent1"/>
+          </a:fillRef>
+          <a:effectRef idx="0">
+            <a:schemeClr val="accent1"/>
+          </a:effectRef>
+          <a:fontRef idx="minor">
+            <a:schemeClr val="tx1"/>
+          </a:fontRef>
+        </p:style>
+      </p:cxnSp>
+      <p:cxnSp>
+        <p:nvCxnSpPr>
+          <p:cNvPr id="127" name="Straight Arrow Connector 126">
+            <a:extLst>
+              <a:ext uri="{FF2B5EF4-FFF2-40B4-BE49-F238E27FC236}">
+                <a16:creationId xmlns:a16="http://schemas.microsoft.com/office/drawing/2014/main" id="{BBF5C6F9-FAE7-1348-813A-A021E15A9F3C}"/>
+              </a:ext>
+            </a:extLst>
+          </p:cNvPr>
+          <p:cNvCxnSpPr>
+            <a:cxnSpLocks/>
+            <a:endCxn id="122" idx="3"/>
+          </p:cNvCxnSpPr>
+          <p:nvPr/>
+        </p:nvCxnSpPr>
+        <p:spPr>
+          <a:xfrm flipH="1" flipV="1">
+            <a:off x="3573600" y="1489081"/>
+            <a:ext cx="2251268" cy="1332894"/>
+          </a:xfrm>
+          <a:prstGeom prst="straightConnector1">
+            <a:avLst/>
+          </a:prstGeom>
+          <a:ln w="12700">
+            <a:solidFill>
+              <a:srgbClr val="545B64"/>
+            </a:solidFill>
+            <a:headEnd type="arrow" w="med" len="sm"/>
+            <a:tailEnd type="none" w="med" len="sm"/>
+          </a:ln>
+        </p:spPr>
+        <p:style>
+          <a:lnRef idx="1">
+            <a:schemeClr val="accent1"/>
+          </a:lnRef>
+          <a:fillRef idx="0">
+            <a:schemeClr val="accent1"/>
+          </a:fillRef>
+          <a:effectRef idx="0">
+            <a:schemeClr val="accent1"/>
+          </a:effectRef>
+          <a:fontRef idx="minor">
+            <a:schemeClr val="tx1"/>
+          </a:fontRef>
+        </p:style>
+      </p:cxnSp>
+      <p:cxnSp>
+        <p:nvCxnSpPr>
+          <p:cNvPr id="130" name="Straight Arrow Connector 129">
+            <a:extLst>
+              <a:ext uri="{FF2B5EF4-FFF2-40B4-BE49-F238E27FC236}">
+                <a16:creationId xmlns:a16="http://schemas.microsoft.com/office/drawing/2014/main" id="{1CEC576B-064D-224C-97D6-7C7600D8CE3E}"/>
+              </a:ext>
+            </a:extLst>
+          </p:cNvPr>
+          <p:cNvCxnSpPr>
+            <a:cxnSpLocks/>
+            <a:stCxn id="119" idx="1"/>
+            <a:endCxn id="111" idx="3"/>
+          </p:cNvCxnSpPr>
+          <p:nvPr/>
+        </p:nvCxnSpPr>
+        <p:spPr>
+          <a:xfrm flipH="1" flipV="1">
+            <a:off x="1381470" y="913930"/>
+            <a:ext cx="1974116" cy="62437"/>
+          </a:xfrm>
+          <a:prstGeom prst="straightConnector1">
+            <a:avLst/>
+          </a:prstGeom>
+          <a:ln w="12700">
+            <a:solidFill>
+              <a:srgbClr val="545B64"/>
+            </a:solidFill>
+            <a:headEnd type="arrow" w="med" len="sm"/>
+            <a:tailEnd type="none" w="med" len="sm"/>
+          </a:ln>
+        </p:spPr>
+        <p:style>
+          <a:lnRef idx="1">
+            <a:schemeClr val="accent1"/>
+          </a:lnRef>
+          <a:fillRef idx="0">
+            <a:schemeClr val="accent1"/>
+          </a:fillRef>
+          <a:effectRef idx="0">
+            <a:schemeClr val="accent1"/>
+          </a:effectRef>
+          <a:fontRef idx="minor">
+            <a:schemeClr val="tx1"/>
+          </a:fontRef>
+        </p:style>
+      </p:cxnSp>
+      <p:cxnSp>
+        <p:nvCxnSpPr>
+          <p:cNvPr id="132" name="Straight Arrow Connector 131">
+            <a:extLst>
+              <a:ext uri="{FF2B5EF4-FFF2-40B4-BE49-F238E27FC236}">
+                <a16:creationId xmlns:a16="http://schemas.microsoft.com/office/drawing/2014/main" id="{56C009DC-28E0-4649-B336-D7B49EE97272}"/>
+              </a:ext>
+            </a:extLst>
+          </p:cNvPr>
+          <p:cNvCxnSpPr>
+            <a:cxnSpLocks/>
+            <a:stCxn id="122" idx="1"/>
+            <a:endCxn id="115" idx="3"/>
+          </p:cNvCxnSpPr>
+          <p:nvPr/>
+        </p:nvCxnSpPr>
+        <p:spPr>
+          <a:xfrm flipH="1">
+            <a:off x="1386350" y="1489081"/>
+            <a:ext cx="1982764" cy="53272"/>
+          </a:xfrm>
+          <a:prstGeom prst="straightConnector1">
+            <a:avLst/>
+          </a:prstGeom>
+          <a:ln w="12700">
+            <a:solidFill>
+              <a:srgbClr val="545B64"/>
+            </a:solidFill>
+            <a:headEnd type="arrow" w="med" len="sm"/>
+            <a:tailEnd type="none" w="med" len="sm"/>
           </a:ln>
         </p:spPr>
         <p:style>

</xml_diff>

<commit_message>
Adding ELB to the diagram
</commit_message>
<xml_diff>
--- a/docs/architecture.pptx
+++ b/docs/architecture.pptx
@@ -12801,8 +12801,8 @@
         </p:nvGrpSpPr>
         <p:grpSpPr>
           <a:xfrm>
-            <a:off x="2921795" y="5495002"/>
-            <a:ext cx="1001720" cy="691189"/>
+            <a:off x="2921794" y="5495003"/>
+            <a:ext cx="1022345" cy="679692"/>
             <a:chOff x="2554666" y="4607363"/>
             <a:chExt cx="2301904" cy="1520257"/>
           </a:xfrm>
@@ -12894,8 +12894,8 @@
         </p:nvGrpSpPr>
         <p:grpSpPr>
           <a:xfrm>
-            <a:off x="1565312" y="4527087"/>
-            <a:ext cx="904224" cy="691189"/>
+            <a:off x="1565312" y="4527088"/>
+            <a:ext cx="922842" cy="679692"/>
             <a:chOff x="364783" y="2784539"/>
             <a:chExt cx="2077862" cy="1520257"/>
           </a:xfrm>
@@ -12987,8 +12987,8 @@
         </p:nvGrpSpPr>
         <p:grpSpPr>
           <a:xfrm>
-            <a:off x="4514123" y="4967849"/>
-            <a:ext cx="821002" cy="580183"/>
+            <a:off x="4514123" y="4967850"/>
+            <a:ext cx="837906" cy="570532"/>
             <a:chOff x="5656931" y="3612846"/>
             <a:chExt cx="1886622" cy="1276103"/>
           </a:xfrm>
@@ -13080,8 +13080,8 @@
         </p:nvGrpSpPr>
         <p:grpSpPr>
           <a:xfrm>
-            <a:off x="4427634" y="5616129"/>
-            <a:ext cx="1001720" cy="578549"/>
+            <a:off x="4427633" y="5616130"/>
+            <a:ext cx="1022345" cy="568926"/>
             <a:chOff x="5535149" y="2183203"/>
             <a:chExt cx="2301904" cy="1272510"/>
           </a:xfrm>
@@ -13173,8 +13173,8 @@
         </p:nvGrpSpPr>
         <p:grpSpPr>
           <a:xfrm>
-            <a:off x="2933922" y="2057891"/>
-            <a:ext cx="1001720" cy="577265"/>
+            <a:off x="2933921" y="2057891"/>
+            <a:ext cx="1022345" cy="567663"/>
             <a:chOff x="7713647" y="5027377"/>
             <a:chExt cx="2301904" cy="1269684"/>
           </a:xfrm>
@@ -13271,8 +13271,8 @@
         </p:nvGrpSpPr>
         <p:grpSpPr>
           <a:xfrm>
-            <a:off x="3024107" y="2656665"/>
-            <a:ext cx="821350" cy="411593"/>
+            <a:off x="3024106" y="2656665"/>
+            <a:ext cx="838261" cy="404747"/>
             <a:chOff x="9510350" y="5079545"/>
             <a:chExt cx="1887422" cy="905291"/>
           </a:xfrm>
@@ -13365,7 +13365,7 @@
         <p:grpSpPr>
           <a:xfrm>
             <a:off x="5626344" y="1951279"/>
-            <a:ext cx="1052883" cy="779257"/>
+            <a:ext cx="1074561" cy="766295"/>
             <a:chOff x="2460054" y="1002878"/>
             <a:chExt cx="2419475" cy="1713962"/>
           </a:xfrm>
@@ -13461,8 +13461,8 @@
         </p:nvGrpSpPr>
         <p:grpSpPr>
           <a:xfrm>
-            <a:off x="5732759" y="2768871"/>
-            <a:ext cx="887700" cy="421683"/>
+            <a:off x="5732758" y="2768871"/>
+            <a:ext cx="905977" cy="414669"/>
             <a:chOff x="2834823" y="2446136"/>
             <a:chExt cx="2039893" cy="927484"/>
           </a:xfrm>
@@ -13566,8 +13566,8 @@
         </p:nvGrpSpPr>
         <p:grpSpPr>
           <a:xfrm>
-            <a:off x="5714809" y="4063742"/>
-            <a:ext cx="1001720" cy="659727"/>
+            <a:off x="5714808" y="4063742"/>
+            <a:ext cx="1022345" cy="648753"/>
             <a:chOff x="8300940" y="699888"/>
             <a:chExt cx="2301904" cy="1451057"/>
           </a:xfrm>
@@ -13660,7 +13660,7 @@
         <p:grpSpPr>
           <a:xfrm>
             <a:off x="5856879" y="5242756"/>
-            <a:ext cx="692039" cy="569423"/>
+            <a:ext cx="706288" cy="559951"/>
             <a:chOff x="9043102" y="2065699"/>
             <a:chExt cx="1590271" cy="1252436"/>
           </a:xfrm>
@@ -13753,7 +13753,7 @@
         <p:grpSpPr>
           <a:xfrm>
             <a:off x="902796" y="2107620"/>
-            <a:ext cx="722400" cy="560590"/>
+            <a:ext cx="737274" cy="551265"/>
             <a:chOff x="5746486" y="5579699"/>
             <a:chExt cx="1660039" cy="1233005"/>
           </a:xfrm>
@@ -13860,8 +13860,8 @@
         </p:nvGrpSpPr>
         <p:grpSpPr>
           <a:xfrm>
-            <a:off x="877783" y="4523865"/>
-            <a:ext cx="466829" cy="563863"/>
+            <a:off x="877783" y="4523866"/>
+            <a:ext cx="476441" cy="554484"/>
             <a:chOff x="640320" y="4509711"/>
             <a:chExt cx="1072750" cy="1240209"/>
           </a:xfrm>
@@ -13957,10 +13957,10 @@
         </p:nvGrpSpPr>
         <p:grpSpPr>
           <a:xfrm>
-            <a:off x="1724211" y="498022"/>
-            <a:ext cx="5096314" cy="5857808"/>
+            <a:off x="1724210" y="498022"/>
+            <a:ext cx="5201245" cy="5827827"/>
             <a:chOff x="5636266" y="3149162"/>
-            <a:chExt cx="11711089" cy="10889647"/>
+            <a:chExt cx="11711089" cy="11017169"/>
           </a:xfrm>
         </p:grpSpPr>
         <p:pic>
@@ -14014,7 +14014,7 @@
           <p:spPr>
             <a:xfrm>
               <a:off x="5636268" y="3149162"/>
-              <a:ext cx="11711087" cy="10889647"/>
+              <a:ext cx="11711087" cy="11017169"/>
             </a:xfrm>
             <a:prstGeom prst="rect">
               <a:avLst/>
@@ -14079,8 +14079,8 @@
         </p:nvGrpSpPr>
         <p:grpSpPr>
           <a:xfrm>
-            <a:off x="2922918" y="3712181"/>
-            <a:ext cx="1001720" cy="1513263"/>
+            <a:off x="2922917" y="3712182"/>
+            <a:ext cx="1022345" cy="1488092"/>
             <a:chOff x="2903390" y="864530"/>
             <a:chExt cx="1476106" cy="2134348"/>
           </a:xfrm>
@@ -14348,8 +14348,8 @@
         </p:nvSpPr>
         <p:spPr>
           <a:xfrm>
-            <a:off x="4450328" y="4140888"/>
-            <a:ext cx="954684" cy="2089930"/>
+            <a:off x="4450327" y="4140888"/>
+            <a:ext cx="974341" cy="2055167"/>
           </a:xfrm>
           <a:prstGeom prst="rect">
             <a:avLst/>
@@ -14410,8 +14410,8 @@
         </p:nvGrpSpPr>
         <p:grpSpPr>
           <a:xfrm>
-            <a:off x="4570018" y="4290146"/>
-            <a:ext cx="709993" cy="479471"/>
+            <a:off x="4570018" y="4290147"/>
+            <a:ext cx="724611" cy="471496"/>
             <a:chOff x="5887876" y="3632939"/>
             <a:chExt cx="1631528" cy="1054587"/>
           </a:xfrm>
@@ -14504,7 +14504,7 @@
         <p:grpSpPr>
           <a:xfrm>
             <a:off x="5989376" y="4762081"/>
-            <a:ext cx="393289" cy="446686"/>
+            <a:ext cx="401387" cy="439256"/>
             <a:chOff x="9355612" y="2065698"/>
             <a:chExt cx="903760" cy="982479"/>
           </a:xfrm>
@@ -14596,8 +14596,8 @@
         </p:nvGrpSpPr>
         <p:grpSpPr>
           <a:xfrm>
-            <a:off x="5799383" y="5780529"/>
-            <a:ext cx="773276" cy="442253"/>
+            <a:off x="5799382" y="5780529"/>
+            <a:ext cx="789197" cy="434897"/>
             <a:chOff x="8917684" y="2065699"/>
             <a:chExt cx="1776951" cy="972729"/>
           </a:xfrm>
@@ -14690,7 +14690,7 @@
         <p:spPr>
           <a:xfrm>
             <a:off x="5776514" y="3950059"/>
-            <a:ext cx="858173" cy="2292472"/>
+            <a:ext cx="875842" cy="2254340"/>
           </a:xfrm>
           <a:prstGeom prst="rect">
             <a:avLst/>
@@ -14751,8 +14751,8 @@
         </p:nvSpPr>
         <p:spPr>
           <a:xfrm>
-            <a:off x="5674041" y="1860441"/>
-            <a:ext cx="971261" cy="1377623"/>
+            <a:off x="5674041" y="1860442"/>
+            <a:ext cx="991259" cy="1354708"/>
           </a:xfrm>
           <a:prstGeom prst="rect">
             <a:avLst/>
@@ -14814,7 +14814,7 @@
         <p:spPr>
           <a:xfrm>
             <a:off x="2933922" y="1974190"/>
-            <a:ext cx="1015537" cy="1588459"/>
+            <a:ext cx="1036446" cy="1562037"/>
           </a:xfrm>
           <a:prstGeom prst="rect">
             <a:avLst/>
@@ -14879,8 +14879,8 @@
         </p:nvCxnSpPr>
         <p:spPr>
           <a:xfrm flipH="1" flipV="1">
-            <a:off x="1366239" y="2214441"/>
-            <a:ext cx="1969631" cy="549045"/>
+            <a:off x="1375781" y="2212664"/>
+            <a:ext cx="1966507" cy="549045"/>
           </a:xfrm>
           <a:prstGeom prst="straightConnector1">
             <a:avLst/>
@@ -14926,8 +14926,8 @@
         </p:nvCxnSpPr>
         <p:spPr>
           <a:xfrm flipH="1" flipV="1">
-            <a:off x="1268209" y="4687422"/>
-            <a:ext cx="594468" cy="1340"/>
+            <a:off x="1276247" y="4684704"/>
+            <a:ext cx="592553" cy="1370"/>
           </a:xfrm>
           <a:prstGeom prst="straightConnector1">
             <a:avLst/>
@@ -14973,8 +14973,8 @@
         </p:nvCxnSpPr>
         <p:spPr>
           <a:xfrm flipV="1">
-            <a:off x="5280011" y="3190554"/>
-            <a:ext cx="896598" cy="1471341"/>
+            <a:off x="5294629" y="3183540"/>
+            <a:ext cx="891118" cy="1472173"/>
           </a:xfrm>
           <a:prstGeom prst="straightConnector1">
             <a:avLst/>
@@ -15020,8 +15020,8 @@
         </p:nvCxnSpPr>
         <p:spPr>
           <a:xfrm flipH="1" flipV="1">
-            <a:off x="2172170" y="4688762"/>
-            <a:ext cx="1095738" cy="967915"/>
+            <a:off x="2184666" y="4686074"/>
+            <a:ext cx="1090368" cy="967915"/>
           </a:xfrm>
           <a:prstGeom prst="straightConnector1">
             <a:avLst/>
@@ -15066,8 +15066,8 @@
         </p:nvCxnSpPr>
         <p:spPr>
           <a:xfrm flipH="1">
-            <a:off x="3570147" y="5378755"/>
-            <a:ext cx="943976" cy="277000"/>
+            <a:off x="3570147" y="5371921"/>
+            <a:ext cx="943976" cy="283834"/>
           </a:xfrm>
           <a:prstGeom prst="straightConnector1">
             <a:avLst/>
@@ -15113,8 +15113,8 @@
         </p:nvCxnSpPr>
         <p:spPr>
           <a:xfrm flipH="1" flipV="1">
-            <a:off x="2172170" y="4688762"/>
-            <a:ext cx="1133378" cy="15177"/>
+            <a:off x="2184666" y="4686074"/>
+            <a:ext cx="1128759" cy="1370"/>
           </a:xfrm>
           <a:prstGeom prst="straightConnector1">
             <a:avLst/>
@@ -15157,7 +15157,7 @@
         <p:spPr>
           <a:xfrm>
             <a:off x="2934775" y="5354699"/>
-            <a:ext cx="973563" cy="879488"/>
+            <a:ext cx="993608" cy="864859"/>
           </a:xfrm>
           <a:prstGeom prst="rect">
             <a:avLst/>
@@ -15222,8 +15222,8 @@
         </p:nvCxnSpPr>
         <p:spPr>
           <a:xfrm flipV="1">
-            <a:off x="3510035" y="4661895"/>
-            <a:ext cx="1059983" cy="42044"/>
+            <a:off x="3522122" y="4655713"/>
+            <a:ext cx="1047896" cy="31731"/>
           </a:xfrm>
           <a:prstGeom prst="straightConnector1">
             <a:avLst/>
@@ -15262,13 +15262,14 @@
           </p:cNvPr>
           <p:cNvCxnSpPr>
             <a:cxnSpLocks/>
+            <a:endCxn id="15" idx="3"/>
           </p:cNvCxnSpPr>
           <p:nvPr/>
         </p:nvCxnSpPr>
         <p:spPr>
           <a:xfrm flipH="1" flipV="1">
-            <a:off x="3530440" y="2761673"/>
-            <a:ext cx="2416102" cy="108130"/>
+            <a:off x="3550984" y="2761709"/>
+            <a:ext cx="2358718" cy="136154"/>
           </a:xfrm>
           <a:prstGeom prst="straightConnector1">
             <a:avLst/>
@@ -15311,7 +15312,7 @@
         <p:grpSpPr>
           <a:xfrm>
             <a:off x="3078959" y="3124600"/>
-            <a:ext cx="633077" cy="373978"/>
+            <a:ext cx="646112" cy="367757"/>
             <a:chOff x="9670186" y="5079545"/>
             <a:chExt cx="1454780" cy="822558"/>
           </a:xfrm>
@@ -15418,8 +15419,8 @@
         </p:blipFill>
         <p:spPr>
           <a:xfrm>
-            <a:off x="4813178" y="3700051"/>
-            <a:ext cx="235132" cy="245659"/>
+            <a:off x="4813177" y="3700051"/>
+            <a:ext cx="239973" cy="250717"/>
           </a:xfrm>
           <a:prstGeom prst="rect">
             <a:avLst/>
@@ -15455,7 +15456,7 @@
         <p:spPr>
           <a:xfrm>
             <a:off x="4776774" y="2968231"/>
-            <a:ext cx="306467" cy="320187"/>
+            <a:ext cx="312777" cy="326779"/>
           </a:xfrm>
           <a:prstGeom prst="rect">
             <a:avLst/>
@@ -15476,8 +15477,8 @@
         </p:nvSpPr>
         <p:spPr>
           <a:xfrm>
-            <a:off x="4561246" y="3273739"/>
-            <a:ext cx="757530" cy="338554"/>
+            <a:off x="4561245" y="3273739"/>
+            <a:ext cx="773127" cy="338554"/>
           </a:xfrm>
           <a:prstGeom prst="rect">
             <a:avLst/>
@@ -15523,9 +15524,9 @@
           <p:nvPr/>
         </p:nvCxnSpPr>
         <p:spPr>
-          <a:xfrm flipH="1">
-            <a:off x="4930081" y="3945710"/>
-            <a:ext cx="663" cy="344436"/>
+          <a:xfrm>
+            <a:off x="4933164" y="3950768"/>
+            <a:ext cx="4331" cy="339379"/>
           </a:xfrm>
           <a:prstGeom prst="straightConnector1">
             <a:avLst/>
@@ -15570,8 +15571,8 @@
         </p:nvCxnSpPr>
         <p:spPr>
           <a:xfrm>
-            <a:off x="3712036" y="3390857"/>
-            <a:ext cx="973926" cy="347542"/>
+            <a:off x="3725071" y="3386427"/>
+            <a:ext cx="960891" cy="351972"/>
           </a:xfrm>
           <a:prstGeom prst="straightConnector1">
             <a:avLst/>
@@ -15610,14 +15611,15 @@
           </p:cNvPr>
           <p:cNvCxnSpPr>
             <a:cxnSpLocks/>
-            <a:endCxn id="196" idx="1"/>
+            <a:stCxn id="7" idx="0"/>
+            <a:endCxn id="144" idx="2"/>
           </p:cNvCxnSpPr>
           <p:nvPr/>
         </p:nvCxnSpPr>
         <p:spPr>
           <a:xfrm flipV="1">
-            <a:off x="2230871" y="3390856"/>
-            <a:ext cx="848088" cy="1217896"/>
+            <a:off x="2026733" y="3913664"/>
+            <a:ext cx="311823" cy="613424"/>
           </a:xfrm>
           <a:prstGeom prst="straightConnector1">
             <a:avLst/>
@@ -15659,8 +15661,8 @@
         </p:nvSpPr>
         <p:spPr>
           <a:xfrm>
-            <a:off x="4448773" y="2901261"/>
-            <a:ext cx="950230" cy="1162665"/>
+            <a:off x="4448772" y="2901262"/>
+            <a:ext cx="969795" cy="1143326"/>
           </a:xfrm>
           <a:prstGeom prst="rect">
             <a:avLst/>
@@ -15725,8 +15727,8 @@
         </p:nvCxnSpPr>
         <p:spPr>
           <a:xfrm>
-            <a:off x="5280011" y="4661895"/>
-            <a:ext cx="803766" cy="207006"/>
+            <a:off x="5294629" y="4655713"/>
+            <a:ext cx="791092" cy="211412"/>
           </a:xfrm>
           <a:prstGeom prst="straightConnector1">
             <a:avLst/>
@@ -15772,8 +15774,8 @@
         </p:nvCxnSpPr>
         <p:spPr>
           <a:xfrm>
-            <a:off x="5280011" y="4661895"/>
-            <a:ext cx="807265" cy="687682"/>
+            <a:off x="5294629" y="4655713"/>
+            <a:ext cx="797391" cy="692087"/>
           </a:xfrm>
           <a:prstGeom prst="straightConnector1">
             <a:avLst/>
@@ -15819,8 +15821,8 @@
         </p:nvCxnSpPr>
         <p:spPr>
           <a:xfrm>
-            <a:off x="5280011" y="4661895"/>
-            <a:ext cx="804347" cy="1225455"/>
+            <a:off x="5294629" y="4655713"/>
+            <a:ext cx="795595" cy="1229860"/>
           </a:xfrm>
           <a:prstGeom prst="straightConnector1">
             <a:avLst/>
@@ -15866,8 +15868,8 @@
         </p:nvCxnSpPr>
         <p:spPr>
           <a:xfrm>
-            <a:off x="5335125" y="5378755"/>
-            <a:ext cx="749233" cy="508595"/>
+            <a:off x="5352029" y="5371921"/>
+            <a:ext cx="738195" cy="513652"/>
           </a:xfrm>
           <a:prstGeom prst="straightConnector1">
             <a:avLst/>
@@ -15909,8 +15911,8 @@
         </p:nvGrpSpPr>
         <p:grpSpPr>
           <a:xfrm>
-            <a:off x="3947913" y="838767"/>
-            <a:ext cx="1001720" cy="578549"/>
+            <a:off x="3947912" y="838768"/>
+            <a:ext cx="1022345" cy="568926"/>
             <a:chOff x="5535149" y="2183203"/>
             <a:chExt cx="2301904" cy="1272510"/>
           </a:xfrm>
@@ -16002,8 +16004,8 @@
         </p:nvSpPr>
         <p:spPr>
           <a:xfrm>
-            <a:off x="2944215" y="754253"/>
-            <a:ext cx="1868964" cy="1134653"/>
+            <a:off x="2944214" y="754254"/>
+            <a:ext cx="1907445" cy="1115780"/>
           </a:xfrm>
           <a:prstGeom prst="rect">
             <a:avLst/>
@@ -16064,8 +16066,8 @@
         </p:nvGrpSpPr>
         <p:grpSpPr>
           <a:xfrm>
-            <a:off x="902795" y="796455"/>
-            <a:ext cx="722400" cy="439309"/>
+            <a:off x="902795" y="796456"/>
+            <a:ext cx="737274" cy="432002"/>
             <a:chOff x="807055" y="1231302"/>
             <a:chExt cx="722400" cy="439309"/>
           </a:xfrm>
@@ -16166,8 +16168,8 @@
         </p:nvGrpSpPr>
         <p:grpSpPr>
           <a:xfrm>
-            <a:off x="907675" y="1424878"/>
-            <a:ext cx="722400" cy="439309"/>
+            <a:off x="907675" y="1424879"/>
+            <a:ext cx="737274" cy="432002"/>
             <a:chOff x="807055" y="1231302"/>
             <a:chExt cx="722400" cy="439309"/>
           </a:xfrm>
@@ -16269,7 +16271,7 @@
         <p:grpSpPr>
           <a:xfrm>
             <a:off x="3088965" y="869546"/>
-            <a:ext cx="774264" cy="449982"/>
+            <a:ext cx="790206" cy="442497"/>
             <a:chOff x="5867654" y="3632939"/>
             <a:chExt cx="1779220" cy="989727"/>
           </a:xfrm>
@@ -16362,8 +16364,8 @@
         </p:nvGrpSpPr>
         <p:grpSpPr>
           <a:xfrm>
-            <a:off x="2945325" y="1382261"/>
-            <a:ext cx="1032040" cy="456784"/>
+            <a:off x="2945324" y="1382261"/>
+            <a:ext cx="1053289" cy="449186"/>
             <a:chOff x="5471645" y="3612846"/>
             <a:chExt cx="2371577" cy="1004690"/>
           </a:xfrm>
@@ -16459,8 +16461,8 @@
         </p:nvCxnSpPr>
         <p:spPr>
           <a:xfrm flipH="1" flipV="1">
-            <a:off x="3560072" y="976367"/>
-            <a:ext cx="2391784" cy="1850996"/>
+            <a:off x="3569772" y="974590"/>
+            <a:ext cx="2382084" cy="1852773"/>
           </a:xfrm>
           <a:prstGeom prst="straightConnector1">
             <a:avLst/>
@@ -16505,8 +16507,8 @@
         </p:nvCxnSpPr>
         <p:spPr>
           <a:xfrm flipH="1" flipV="1">
-            <a:off x="3573600" y="1489081"/>
-            <a:ext cx="2251268" cy="1332894"/>
+            <a:off x="3586534" y="1487305"/>
+            <a:ext cx="2238334" cy="1334670"/>
           </a:xfrm>
           <a:prstGeom prst="straightConnector1">
             <a:avLst/>
@@ -16552,8 +16554,8 @@
         </p:nvCxnSpPr>
         <p:spPr>
           <a:xfrm flipH="1" flipV="1">
-            <a:off x="1381470" y="913930"/>
-            <a:ext cx="1974116" cy="62437"/>
+            <a:off x="1391326" y="911977"/>
+            <a:ext cx="1969749" cy="62613"/>
           </a:xfrm>
           <a:prstGeom prst="straightConnector1">
             <a:avLst/>
@@ -16599,8 +16601,148 @@
         </p:nvCxnSpPr>
         <p:spPr>
           <a:xfrm flipH="1">
-            <a:off x="1386350" y="1489081"/>
-            <a:ext cx="1982764" cy="53272"/>
+            <a:off x="1396206" y="1487305"/>
+            <a:ext cx="1981632" cy="53095"/>
+          </a:xfrm>
+          <a:prstGeom prst="straightConnector1">
+            <a:avLst/>
+          </a:prstGeom>
+          <a:ln w="12700">
+            <a:solidFill>
+              <a:srgbClr val="545B64"/>
+            </a:solidFill>
+            <a:headEnd type="arrow" w="med" len="sm"/>
+            <a:tailEnd type="none" w="med" len="sm"/>
+          </a:ln>
+        </p:spPr>
+        <p:style>
+          <a:lnRef idx="1">
+            <a:schemeClr val="accent1"/>
+          </a:lnRef>
+          <a:fillRef idx="0">
+            <a:schemeClr val="accent1"/>
+          </a:fillRef>
+          <a:effectRef idx="0">
+            <a:schemeClr val="accent1"/>
+          </a:effectRef>
+          <a:fontRef idx="minor">
+            <a:schemeClr val="tx1"/>
+          </a:fontRef>
+        </p:style>
+      </p:cxnSp>
+      <p:grpSp>
+        <p:nvGrpSpPr>
+          <p:cNvPr id="108" name="Group 107">
+            <a:extLst>
+              <a:ext uri="{FF2B5EF4-FFF2-40B4-BE49-F238E27FC236}">
+                <a16:creationId xmlns:a16="http://schemas.microsoft.com/office/drawing/2014/main" id="{A6A7A117-EC32-8940-BD45-BAA5555145EE}"/>
+              </a:ext>
+            </a:extLst>
+          </p:cNvPr>
+          <p:cNvGrpSpPr/>
+          <p:nvPr/>
+        </p:nvGrpSpPr>
+        <p:grpSpPr>
+          <a:xfrm>
+            <a:off x="1817568" y="3245953"/>
+            <a:ext cx="1041976" cy="667711"/>
+            <a:chOff x="6833032" y="1140448"/>
+            <a:chExt cx="2301904" cy="1418437"/>
+          </a:xfrm>
+        </p:grpSpPr>
+        <p:sp>
+          <p:nvSpPr>
+            <p:cNvPr id="144" name="TextBox 143">
+              <a:extLst>
+                <a:ext uri="{FF2B5EF4-FFF2-40B4-BE49-F238E27FC236}">
+                  <a16:creationId xmlns:a16="http://schemas.microsoft.com/office/drawing/2014/main" id="{9D1892DB-5DF5-2548-B9A8-EEF574046A39}"/>
+                </a:ext>
+              </a:extLst>
+            </p:cNvPr>
+            <p:cNvSpPr txBox="1"/>
+            <p:nvPr/>
+          </p:nvSpPr>
+          <p:spPr>
+            <a:xfrm>
+              <a:off x="6833032" y="1851648"/>
+              <a:ext cx="2301904" cy="707237"/>
+            </a:xfrm>
+            <a:prstGeom prst="rect">
+              <a:avLst/>
+            </a:prstGeom>
+            <a:noFill/>
+          </p:spPr>
+          <p:txBody>
+            <a:bodyPr wrap="square" rtlCol="0">
+              <a:spAutoFit/>
+            </a:bodyPr>
+            <a:lstStyle/>
+            <a:p>
+              <a:pPr algn="ctr"/>
+              <a:r>
+                <a:rPr lang="en-US" sz="800" dirty="0"/>
+                <a:t>Elastic Load Balancing (ELB)</a:t>
+              </a:r>
+            </a:p>
+          </p:txBody>
+        </p:sp>
+        <p:pic>
+          <p:nvPicPr>
+            <p:cNvPr id="145" name="Graphic 144">
+              <a:extLst>
+                <a:ext uri="{FF2B5EF4-FFF2-40B4-BE49-F238E27FC236}">
+                  <a16:creationId xmlns:a16="http://schemas.microsoft.com/office/drawing/2014/main" id="{DA46C81F-83F5-2D40-B4C2-4E8F0F5C4B0C}"/>
+                </a:ext>
+              </a:extLst>
+            </p:cNvPr>
+            <p:cNvPicPr>
+              <a:picLocks noChangeAspect="1"/>
+            </p:cNvPicPr>
+            <p:nvPr/>
+          </p:nvPicPr>
+          <p:blipFill>
+            <a:blip r:embed="rId38">
+              <a:extLst>
+                <a:ext uri="{96DAC541-7B7A-43D3-8B79-37D633B846F1}">
+                  <asvg:svgBlip xmlns:asvg="http://schemas.microsoft.com/office/drawing/2016/SVG/main" r:embed="rId39"/>
+                </a:ext>
+              </a:extLst>
+            </a:blip>
+            <a:stretch>
+              <a:fillRect/>
+            </a:stretch>
+          </p:blipFill>
+          <p:spPr>
+            <a:xfrm>
+              <a:off x="7628384" y="1140448"/>
+              <a:ext cx="711200" cy="711200"/>
+            </a:xfrm>
+            <a:prstGeom prst="rect">
+              <a:avLst/>
+            </a:prstGeom>
+          </p:spPr>
+        </p:pic>
+      </p:grpSp>
+      <p:cxnSp>
+        <p:nvCxnSpPr>
+          <p:cNvPr id="148" name="Straight Arrow Connector 147">
+            <a:extLst>
+              <a:ext uri="{FF2B5EF4-FFF2-40B4-BE49-F238E27FC236}">
+                <a16:creationId xmlns:a16="http://schemas.microsoft.com/office/drawing/2014/main" id="{E47AEEDD-86A9-3A4B-9D26-100525C45E83}"/>
+              </a:ext>
+            </a:extLst>
+          </p:cNvPr>
+          <p:cNvCxnSpPr>
+            <a:cxnSpLocks/>
+            <a:stCxn id="145" idx="3"/>
+            <a:endCxn id="196" idx="1"/>
+          </p:cNvCxnSpPr>
+          <p:nvPr/>
+        </p:nvCxnSpPr>
+        <p:spPr>
+          <a:xfrm flipV="1">
+            <a:off x="2499522" y="3386427"/>
+            <a:ext cx="579437" cy="26920"/>
           </a:xfrm>
           <a:prstGeom prst="straightConnector1">
             <a:avLst/>

</xml_diff>